<commit_message>
disable a few links
</commit_message>
<xml_diff>
--- a/img/creation_img_video.pptx
+++ b/img/creation_img_video.pptx
@@ -2,12 +2,12 @@
 <file path=ppt/presentation.xml><?xml version="1.0" encoding="utf-8"?>
 <p:presentation xmlns:a="http://schemas.openxmlformats.org/drawingml/2006/main" xmlns:r="http://schemas.openxmlformats.org/officeDocument/2006/relationships" xmlns:p="http://schemas.openxmlformats.org/presentationml/2006/main" saveSubsetFonts="1" autoCompressPictures="0">
   <p:sldMasterIdLst>
-    <p:sldMasterId id="2147483648" r:id="rId1"/>
+    <p:sldMasterId id="2147483660" r:id="rId1"/>
   </p:sldMasterIdLst>
   <p:sldIdLst>
     <p:sldId id="256" r:id="rId2"/>
   </p:sldIdLst>
-  <p:sldSz cx="12192000" cy="6858000"/>
+  <p:sldSz cx="10799763" cy="7199313"/>
   <p:notesSz cx="6858000" cy="9144000"/>
   <p:defaultTextStyle>
     <a:defPPr>
@@ -136,15 +136,15 @@
         </p:nvSpPr>
         <p:spPr>
           <a:xfrm>
-            <a:off x="1524000" y="1122363"/>
-            <a:ext cx="9144000" cy="2387600"/>
+            <a:off x="809982" y="1178222"/>
+            <a:ext cx="9179799" cy="2506427"/>
           </a:xfrm>
         </p:spPr>
         <p:txBody>
           <a:bodyPr anchor="b"/>
           <a:lstStyle>
             <a:lvl1pPr algn="ctr">
-              <a:defRPr sz="6000"/>
+              <a:defRPr sz="6299"/>
             </a:lvl1pPr>
           </a:lstStyle>
           <a:p>
@@ -152,7 +152,7 @@
               <a:rPr lang="en-US" smtClean="0"/>
               <a:t>Click to edit Master title style</a:t>
             </a:r>
-            <a:endParaRPr lang="en-US"/>
+            <a:endParaRPr lang="en-US" dirty="0"/>
           </a:p>
         </p:txBody>
       </p:sp>
@@ -168,8 +168,8 @@
         </p:nvSpPr>
         <p:spPr>
           <a:xfrm>
-            <a:off x="1524000" y="3602038"/>
-            <a:ext cx="9144000" cy="1655762"/>
+            <a:off x="1349971" y="3781306"/>
+            <a:ext cx="8099822" cy="1738167"/>
           </a:xfrm>
         </p:spPr>
         <p:txBody>
@@ -177,39 +177,39 @@
           <a:lstStyle>
             <a:lvl1pPr marL="0" indent="0" algn="ctr">
               <a:buNone/>
-              <a:defRPr sz="2400"/>
+              <a:defRPr sz="2520"/>
             </a:lvl1pPr>
-            <a:lvl2pPr marL="457200" indent="0" algn="ctr">
-              <a:buNone/>
-              <a:defRPr sz="2000"/>
+            <a:lvl2pPr marL="479969" indent="0" algn="ctr">
+              <a:buNone/>
+              <a:defRPr sz="2100"/>
             </a:lvl2pPr>
-            <a:lvl3pPr marL="914400" indent="0" algn="ctr">
-              <a:buNone/>
-              <a:defRPr sz="1800"/>
+            <a:lvl3pPr marL="959937" indent="0" algn="ctr">
+              <a:buNone/>
+              <a:defRPr sz="1890"/>
             </a:lvl3pPr>
-            <a:lvl4pPr marL="1371600" indent="0" algn="ctr">
-              <a:buNone/>
-              <a:defRPr sz="1600"/>
+            <a:lvl4pPr marL="1439906" indent="0" algn="ctr">
+              <a:buNone/>
+              <a:defRPr sz="1680"/>
             </a:lvl4pPr>
-            <a:lvl5pPr marL="1828800" indent="0" algn="ctr">
-              <a:buNone/>
-              <a:defRPr sz="1600"/>
+            <a:lvl5pPr marL="1919874" indent="0" algn="ctr">
+              <a:buNone/>
+              <a:defRPr sz="1680"/>
             </a:lvl5pPr>
-            <a:lvl6pPr marL="2286000" indent="0" algn="ctr">
-              <a:buNone/>
-              <a:defRPr sz="1600"/>
+            <a:lvl6pPr marL="2399843" indent="0" algn="ctr">
+              <a:buNone/>
+              <a:defRPr sz="1680"/>
             </a:lvl6pPr>
-            <a:lvl7pPr marL="2743200" indent="0" algn="ctr">
-              <a:buNone/>
-              <a:defRPr sz="1600"/>
+            <a:lvl7pPr marL="2879811" indent="0" algn="ctr">
+              <a:buNone/>
+              <a:defRPr sz="1680"/>
             </a:lvl7pPr>
-            <a:lvl8pPr marL="3200400" indent="0" algn="ctr">
-              <a:buNone/>
-              <a:defRPr sz="1600"/>
+            <a:lvl8pPr marL="3359780" indent="0" algn="ctr">
+              <a:buNone/>
+              <a:defRPr sz="1680"/>
             </a:lvl8pPr>
-            <a:lvl9pPr marL="3657600" indent="0" algn="ctr">
-              <a:buNone/>
-              <a:defRPr sz="1600"/>
+            <a:lvl9pPr marL="3839748" indent="0" algn="ctr">
+              <a:buNone/>
+              <a:defRPr sz="1680"/>
             </a:lvl9pPr>
           </a:lstStyle>
           <a:p>
@@ -217,7 +217,7 @@
               <a:rPr lang="en-US" smtClean="0"/>
               <a:t>Click to edit Master subtitle style</a:t>
             </a:r>
-            <a:endParaRPr lang="en-US"/>
+            <a:endParaRPr lang="en-US" dirty="0"/>
           </a:p>
         </p:txBody>
       </p:sp>
@@ -287,11 +287,6 @@
         </p:txBody>
       </p:sp>
     </p:spTree>
-    <p:extLst>
-      <p:ext uri="{BB962C8B-B14F-4D97-AF65-F5344CB8AC3E}">
-        <p14:creationId xmlns:p14="http://schemas.microsoft.com/office/powerpoint/2010/main" val="438658748"/>
-      </p:ext>
-    </p:extLst>
   </p:cSld>
   <p:clrMapOvr>
     <a:masterClrMapping/>
@@ -335,7 +330,7 @@
               <a:rPr lang="en-US" smtClean="0"/>
               <a:t>Click to edit Master title style</a:t>
             </a:r>
-            <a:endParaRPr lang="en-US"/>
+            <a:endParaRPr lang="en-US" dirty="0"/>
           </a:p>
         </p:txBody>
       </p:sp>
@@ -387,7 +382,7 @@
               <a:rPr lang="en-US" smtClean="0"/>
               <a:t>Fifth level</a:t>
             </a:r>
-            <a:endParaRPr lang="en-US"/>
+            <a:endParaRPr lang="en-US" dirty="0"/>
           </a:p>
         </p:txBody>
       </p:sp>
@@ -457,11 +452,6 @@
         </p:txBody>
       </p:sp>
     </p:spTree>
-    <p:extLst>
-      <p:ext uri="{BB962C8B-B14F-4D97-AF65-F5344CB8AC3E}">
-        <p14:creationId xmlns:p14="http://schemas.microsoft.com/office/powerpoint/2010/main" val="1943876834"/>
-      </p:ext>
-    </p:extLst>
   </p:cSld>
   <p:clrMapOvr>
     <a:masterClrMapping/>
@@ -498,8 +488,8 @@
         </p:nvSpPr>
         <p:spPr>
           <a:xfrm>
-            <a:off x="8724900" y="365125"/>
-            <a:ext cx="2628900" cy="5811838"/>
+            <a:off x="7728581" y="383297"/>
+            <a:ext cx="2328699" cy="6101085"/>
           </a:xfrm>
         </p:spPr>
         <p:txBody>
@@ -510,7 +500,7 @@
               <a:rPr lang="en-US" smtClean="0"/>
               <a:t>Click to edit Master title style</a:t>
             </a:r>
-            <a:endParaRPr lang="en-US"/>
+            <a:endParaRPr lang="en-US" dirty="0"/>
           </a:p>
         </p:txBody>
       </p:sp>
@@ -526,8 +516,8 @@
         </p:nvSpPr>
         <p:spPr>
           <a:xfrm>
-            <a:off x="838200" y="365125"/>
-            <a:ext cx="7734300" cy="5811838"/>
+            <a:off x="742484" y="383297"/>
+            <a:ext cx="6851100" cy="6101085"/>
           </a:xfrm>
         </p:spPr>
         <p:txBody>
@@ -567,7 +557,7 @@
               <a:rPr lang="en-US" smtClean="0"/>
               <a:t>Fifth level</a:t>
             </a:r>
-            <a:endParaRPr lang="en-US"/>
+            <a:endParaRPr lang="en-US" dirty="0"/>
           </a:p>
         </p:txBody>
       </p:sp>
@@ -637,11 +627,6 @@
         </p:txBody>
       </p:sp>
     </p:spTree>
-    <p:extLst>
-      <p:ext uri="{BB962C8B-B14F-4D97-AF65-F5344CB8AC3E}">
-        <p14:creationId xmlns:p14="http://schemas.microsoft.com/office/powerpoint/2010/main" val="1069227227"/>
-      </p:ext>
-    </p:extLst>
   </p:cSld>
   <p:clrMapOvr>
     <a:masterClrMapping/>
@@ -685,7 +670,7 @@
               <a:rPr lang="en-US" smtClean="0"/>
               <a:t>Click to edit Master title style</a:t>
             </a:r>
-            <a:endParaRPr lang="en-US"/>
+            <a:endParaRPr lang="en-US" dirty="0"/>
           </a:p>
         </p:txBody>
       </p:sp>
@@ -737,7 +722,7 @@
               <a:rPr lang="en-US" smtClean="0"/>
               <a:t>Fifth level</a:t>
             </a:r>
-            <a:endParaRPr lang="en-US"/>
+            <a:endParaRPr lang="en-US" dirty="0"/>
           </a:p>
         </p:txBody>
       </p:sp>
@@ -807,11 +792,6 @@
         </p:txBody>
       </p:sp>
     </p:spTree>
-    <p:extLst>
-      <p:ext uri="{BB962C8B-B14F-4D97-AF65-F5344CB8AC3E}">
-        <p14:creationId xmlns:p14="http://schemas.microsoft.com/office/powerpoint/2010/main" val="226217485"/>
-      </p:ext>
-    </p:extLst>
   </p:cSld>
   <p:clrMapOvr>
     <a:masterClrMapping/>
@@ -848,15 +828,15 @@
         </p:nvSpPr>
         <p:spPr>
           <a:xfrm>
-            <a:off x="831850" y="1709738"/>
-            <a:ext cx="10515600" cy="2852737"/>
+            <a:off x="736859" y="1794831"/>
+            <a:ext cx="9314796" cy="2994714"/>
           </a:xfrm>
         </p:spPr>
         <p:txBody>
           <a:bodyPr anchor="b"/>
           <a:lstStyle>
             <a:lvl1pPr>
-              <a:defRPr sz="6000"/>
+              <a:defRPr sz="6299"/>
             </a:lvl1pPr>
           </a:lstStyle>
           <a:p>
@@ -864,7 +844,7 @@
               <a:rPr lang="en-US" smtClean="0"/>
               <a:t>Click to edit Master title style</a:t>
             </a:r>
-            <a:endParaRPr lang="en-US"/>
+            <a:endParaRPr lang="en-US" dirty="0"/>
           </a:p>
         </p:txBody>
       </p:sp>
@@ -880,8 +860,8 @@
         </p:nvSpPr>
         <p:spPr>
           <a:xfrm>
-            <a:off x="831850" y="4589463"/>
-            <a:ext cx="10515600" cy="1500187"/>
+            <a:off x="736859" y="4817876"/>
+            <a:ext cx="9314796" cy="1574849"/>
           </a:xfrm>
         </p:spPr>
         <p:txBody>
@@ -889,17 +869,15 @@
           <a:lstStyle>
             <a:lvl1pPr marL="0" indent="0">
               <a:buNone/>
-              <a:defRPr sz="2400">
+              <a:defRPr sz="2520">
                 <a:solidFill>
-                  <a:schemeClr val="tx1">
-                    <a:tint val="75000"/>
-                  </a:schemeClr>
+                  <a:schemeClr val="tx1"/>
                 </a:solidFill>
               </a:defRPr>
             </a:lvl1pPr>
-            <a:lvl2pPr marL="457200" indent="0">
-              <a:buNone/>
-              <a:defRPr sz="2000">
+            <a:lvl2pPr marL="479969" indent="0">
+              <a:buNone/>
+              <a:defRPr sz="2100">
                 <a:solidFill>
                   <a:schemeClr val="tx1">
                     <a:tint val="75000"/>
@@ -907,9 +885,9 @@
                 </a:solidFill>
               </a:defRPr>
             </a:lvl2pPr>
-            <a:lvl3pPr marL="914400" indent="0">
-              <a:buNone/>
-              <a:defRPr sz="1800">
+            <a:lvl3pPr marL="959937" indent="0">
+              <a:buNone/>
+              <a:defRPr sz="1890">
                 <a:solidFill>
                   <a:schemeClr val="tx1">
                     <a:tint val="75000"/>
@@ -917,9 +895,9 @@
                 </a:solidFill>
               </a:defRPr>
             </a:lvl3pPr>
-            <a:lvl4pPr marL="1371600" indent="0">
-              <a:buNone/>
-              <a:defRPr sz="1600">
+            <a:lvl4pPr marL="1439906" indent="0">
+              <a:buNone/>
+              <a:defRPr sz="1680">
                 <a:solidFill>
                   <a:schemeClr val="tx1">
                     <a:tint val="75000"/>
@@ -927,9 +905,9 @@
                 </a:solidFill>
               </a:defRPr>
             </a:lvl4pPr>
-            <a:lvl5pPr marL="1828800" indent="0">
-              <a:buNone/>
-              <a:defRPr sz="1600">
+            <a:lvl5pPr marL="1919874" indent="0">
+              <a:buNone/>
+              <a:defRPr sz="1680">
                 <a:solidFill>
                   <a:schemeClr val="tx1">
                     <a:tint val="75000"/>
@@ -937,9 +915,9 @@
                 </a:solidFill>
               </a:defRPr>
             </a:lvl5pPr>
-            <a:lvl6pPr marL="2286000" indent="0">
-              <a:buNone/>
-              <a:defRPr sz="1600">
+            <a:lvl6pPr marL="2399843" indent="0">
+              <a:buNone/>
+              <a:defRPr sz="1680">
                 <a:solidFill>
                   <a:schemeClr val="tx1">
                     <a:tint val="75000"/>
@@ -947,9 +925,9 @@
                 </a:solidFill>
               </a:defRPr>
             </a:lvl6pPr>
-            <a:lvl7pPr marL="2743200" indent="0">
-              <a:buNone/>
-              <a:defRPr sz="1600">
+            <a:lvl7pPr marL="2879811" indent="0">
+              <a:buNone/>
+              <a:defRPr sz="1680">
                 <a:solidFill>
                   <a:schemeClr val="tx1">
                     <a:tint val="75000"/>
@@ -957,9 +935,9 @@
                 </a:solidFill>
               </a:defRPr>
             </a:lvl7pPr>
-            <a:lvl8pPr marL="3200400" indent="0">
-              <a:buNone/>
-              <a:defRPr sz="1600">
+            <a:lvl8pPr marL="3359780" indent="0">
+              <a:buNone/>
+              <a:defRPr sz="1680">
                 <a:solidFill>
                   <a:schemeClr val="tx1">
                     <a:tint val="75000"/>
@@ -967,9 +945,9 @@
                 </a:solidFill>
               </a:defRPr>
             </a:lvl8pPr>
-            <a:lvl9pPr marL="3657600" indent="0">
-              <a:buNone/>
-              <a:defRPr sz="1600">
+            <a:lvl9pPr marL="3839748" indent="0">
+              <a:buNone/>
+              <a:defRPr sz="1680">
                 <a:solidFill>
                   <a:schemeClr val="tx1">
                     <a:tint val="75000"/>
@@ -1053,11 +1031,6 @@
         </p:txBody>
       </p:sp>
     </p:spTree>
-    <p:extLst>
-      <p:ext uri="{BB962C8B-B14F-4D97-AF65-F5344CB8AC3E}">
-        <p14:creationId xmlns:p14="http://schemas.microsoft.com/office/powerpoint/2010/main" val="991215205"/>
-      </p:ext>
-    </p:extLst>
   </p:cSld>
   <p:clrMapOvr>
     <a:masterClrMapping/>
@@ -1101,7 +1074,7 @@
               <a:rPr lang="en-US" smtClean="0"/>
               <a:t>Click to edit Master title style</a:t>
             </a:r>
-            <a:endParaRPr lang="en-US"/>
+            <a:endParaRPr lang="en-US" dirty="0"/>
           </a:p>
         </p:txBody>
       </p:sp>
@@ -1117,8 +1090,8 @@
         </p:nvSpPr>
         <p:spPr>
           <a:xfrm>
-            <a:off x="838200" y="1825625"/>
-            <a:ext cx="5181600" cy="4351338"/>
+            <a:off x="742484" y="1916484"/>
+            <a:ext cx="4589899" cy="4567898"/>
           </a:xfrm>
         </p:spPr>
         <p:txBody>
@@ -1158,7 +1131,7 @@
               <a:rPr lang="en-US" smtClean="0"/>
               <a:t>Fifth level</a:t>
             </a:r>
-            <a:endParaRPr lang="en-US"/>
+            <a:endParaRPr lang="en-US" dirty="0"/>
           </a:p>
         </p:txBody>
       </p:sp>
@@ -1174,8 +1147,8 @@
         </p:nvSpPr>
         <p:spPr>
           <a:xfrm>
-            <a:off x="6172200" y="1825625"/>
-            <a:ext cx="5181600" cy="4351338"/>
+            <a:off x="5467380" y="1916484"/>
+            <a:ext cx="4589899" cy="4567898"/>
           </a:xfrm>
         </p:spPr>
         <p:txBody>
@@ -1215,7 +1188,7 @@
               <a:rPr lang="en-US" smtClean="0"/>
               <a:t>Fifth level</a:t>
             </a:r>
-            <a:endParaRPr lang="en-US"/>
+            <a:endParaRPr lang="en-US" dirty="0"/>
           </a:p>
         </p:txBody>
       </p:sp>
@@ -1285,11 +1258,6 @@
         </p:txBody>
       </p:sp>
     </p:spTree>
-    <p:extLst>
-      <p:ext uri="{BB962C8B-B14F-4D97-AF65-F5344CB8AC3E}">
-        <p14:creationId xmlns:p14="http://schemas.microsoft.com/office/powerpoint/2010/main" val="1323300656"/>
-      </p:ext>
-    </p:extLst>
   </p:cSld>
   <p:clrMapOvr>
     <a:masterClrMapping/>
@@ -1326,8 +1294,8 @@
         </p:nvSpPr>
         <p:spPr>
           <a:xfrm>
-            <a:off x="839788" y="365125"/>
-            <a:ext cx="10515600" cy="1325563"/>
+            <a:off x="743890" y="383299"/>
+            <a:ext cx="9314796" cy="1391534"/>
           </a:xfrm>
         </p:spPr>
         <p:txBody>
@@ -1338,7 +1306,7 @@
               <a:rPr lang="en-US" smtClean="0"/>
               <a:t>Click to edit Master title style</a:t>
             </a:r>
-            <a:endParaRPr lang="en-US"/>
+            <a:endParaRPr lang="en-US" dirty="0"/>
           </a:p>
         </p:txBody>
       </p:sp>
@@ -1354,8 +1322,8 @@
         </p:nvSpPr>
         <p:spPr>
           <a:xfrm>
-            <a:off x="839788" y="1681163"/>
-            <a:ext cx="5157787" cy="823912"/>
+            <a:off x="743892" y="1764832"/>
+            <a:ext cx="4568805" cy="864917"/>
           </a:xfrm>
         </p:spPr>
         <p:txBody>
@@ -1363,39 +1331,39 @@
           <a:lstStyle>
             <a:lvl1pPr marL="0" indent="0">
               <a:buNone/>
-              <a:defRPr sz="2400" b="1"/>
+              <a:defRPr sz="2520" b="1"/>
             </a:lvl1pPr>
-            <a:lvl2pPr marL="457200" indent="0">
-              <a:buNone/>
-              <a:defRPr sz="2000" b="1"/>
+            <a:lvl2pPr marL="479969" indent="0">
+              <a:buNone/>
+              <a:defRPr sz="2100" b="1"/>
             </a:lvl2pPr>
-            <a:lvl3pPr marL="914400" indent="0">
-              <a:buNone/>
-              <a:defRPr sz="1800" b="1"/>
+            <a:lvl3pPr marL="959937" indent="0">
+              <a:buNone/>
+              <a:defRPr sz="1890" b="1"/>
             </a:lvl3pPr>
-            <a:lvl4pPr marL="1371600" indent="0">
-              <a:buNone/>
-              <a:defRPr sz="1600" b="1"/>
+            <a:lvl4pPr marL="1439906" indent="0">
+              <a:buNone/>
+              <a:defRPr sz="1680" b="1"/>
             </a:lvl4pPr>
-            <a:lvl5pPr marL="1828800" indent="0">
-              <a:buNone/>
-              <a:defRPr sz="1600" b="1"/>
+            <a:lvl5pPr marL="1919874" indent="0">
+              <a:buNone/>
+              <a:defRPr sz="1680" b="1"/>
             </a:lvl5pPr>
-            <a:lvl6pPr marL="2286000" indent="0">
-              <a:buNone/>
-              <a:defRPr sz="1600" b="1"/>
+            <a:lvl6pPr marL="2399843" indent="0">
+              <a:buNone/>
+              <a:defRPr sz="1680" b="1"/>
             </a:lvl6pPr>
-            <a:lvl7pPr marL="2743200" indent="0">
-              <a:buNone/>
-              <a:defRPr sz="1600" b="1"/>
+            <a:lvl7pPr marL="2879811" indent="0">
+              <a:buNone/>
+              <a:defRPr sz="1680" b="1"/>
             </a:lvl7pPr>
-            <a:lvl8pPr marL="3200400" indent="0">
-              <a:buNone/>
-              <a:defRPr sz="1600" b="1"/>
+            <a:lvl8pPr marL="3359780" indent="0">
+              <a:buNone/>
+              <a:defRPr sz="1680" b="1"/>
             </a:lvl8pPr>
-            <a:lvl9pPr marL="3657600" indent="0">
-              <a:buNone/>
-              <a:defRPr sz="1600" b="1"/>
+            <a:lvl9pPr marL="3839748" indent="0">
+              <a:buNone/>
+              <a:defRPr sz="1680" b="1"/>
             </a:lvl9pPr>
           </a:lstStyle>
           <a:p>
@@ -1419,8 +1387,8 @@
         </p:nvSpPr>
         <p:spPr>
           <a:xfrm>
-            <a:off x="839788" y="2505075"/>
-            <a:ext cx="5157787" cy="3684588"/>
+            <a:off x="743892" y="2629749"/>
+            <a:ext cx="4568805" cy="3867965"/>
           </a:xfrm>
         </p:spPr>
         <p:txBody>
@@ -1460,7 +1428,7 @@
               <a:rPr lang="en-US" smtClean="0"/>
               <a:t>Fifth level</a:t>
             </a:r>
-            <a:endParaRPr lang="en-US"/>
+            <a:endParaRPr lang="en-US" dirty="0"/>
           </a:p>
         </p:txBody>
       </p:sp>
@@ -1476,8 +1444,8 @@
         </p:nvSpPr>
         <p:spPr>
           <a:xfrm>
-            <a:off x="6172200" y="1681163"/>
-            <a:ext cx="5183188" cy="823912"/>
+            <a:off x="5467381" y="1764832"/>
+            <a:ext cx="4591306" cy="864917"/>
           </a:xfrm>
         </p:spPr>
         <p:txBody>
@@ -1485,39 +1453,39 @@
           <a:lstStyle>
             <a:lvl1pPr marL="0" indent="0">
               <a:buNone/>
-              <a:defRPr sz="2400" b="1"/>
+              <a:defRPr sz="2520" b="1"/>
             </a:lvl1pPr>
-            <a:lvl2pPr marL="457200" indent="0">
-              <a:buNone/>
-              <a:defRPr sz="2000" b="1"/>
+            <a:lvl2pPr marL="479969" indent="0">
+              <a:buNone/>
+              <a:defRPr sz="2100" b="1"/>
             </a:lvl2pPr>
-            <a:lvl3pPr marL="914400" indent="0">
-              <a:buNone/>
-              <a:defRPr sz="1800" b="1"/>
+            <a:lvl3pPr marL="959937" indent="0">
+              <a:buNone/>
+              <a:defRPr sz="1890" b="1"/>
             </a:lvl3pPr>
-            <a:lvl4pPr marL="1371600" indent="0">
-              <a:buNone/>
-              <a:defRPr sz="1600" b="1"/>
+            <a:lvl4pPr marL="1439906" indent="0">
+              <a:buNone/>
+              <a:defRPr sz="1680" b="1"/>
             </a:lvl4pPr>
-            <a:lvl5pPr marL="1828800" indent="0">
-              <a:buNone/>
-              <a:defRPr sz="1600" b="1"/>
+            <a:lvl5pPr marL="1919874" indent="0">
+              <a:buNone/>
+              <a:defRPr sz="1680" b="1"/>
             </a:lvl5pPr>
-            <a:lvl6pPr marL="2286000" indent="0">
-              <a:buNone/>
-              <a:defRPr sz="1600" b="1"/>
+            <a:lvl6pPr marL="2399843" indent="0">
+              <a:buNone/>
+              <a:defRPr sz="1680" b="1"/>
             </a:lvl6pPr>
-            <a:lvl7pPr marL="2743200" indent="0">
-              <a:buNone/>
-              <a:defRPr sz="1600" b="1"/>
+            <a:lvl7pPr marL="2879811" indent="0">
+              <a:buNone/>
+              <a:defRPr sz="1680" b="1"/>
             </a:lvl7pPr>
-            <a:lvl8pPr marL="3200400" indent="0">
-              <a:buNone/>
-              <a:defRPr sz="1600" b="1"/>
+            <a:lvl8pPr marL="3359780" indent="0">
+              <a:buNone/>
+              <a:defRPr sz="1680" b="1"/>
             </a:lvl8pPr>
-            <a:lvl9pPr marL="3657600" indent="0">
-              <a:buNone/>
-              <a:defRPr sz="1600" b="1"/>
+            <a:lvl9pPr marL="3839748" indent="0">
+              <a:buNone/>
+              <a:defRPr sz="1680" b="1"/>
             </a:lvl9pPr>
           </a:lstStyle>
           <a:p>
@@ -1541,8 +1509,8 @@
         </p:nvSpPr>
         <p:spPr>
           <a:xfrm>
-            <a:off x="6172200" y="2505075"/>
-            <a:ext cx="5183188" cy="3684588"/>
+            <a:off x="5467381" y="2629749"/>
+            <a:ext cx="4591306" cy="3867965"/>
           </a:xfrm>
         </p:spPr>
         <p:txBody>
@@ -1582,7 +1550,7 @@
               <a:rPr lang="en-US" smtClean="0"/>
               <a:t>Fifth level</a:t>
             </a:r>
-            <a:endParaRPr lang="en-US"/>
+            <a:endParaRPr lang="en-US" dirty="0"/>
           </a:p>
         </p:txBody>
       </p:sp>
@@ -1652,11 +1620,6 @@
         </p:txBody>
       </p:sp>
     </p:spTree>
-    <p:extLst>
-      <p:ext uri="{BB962C8B-B14F-4D97-AF65-F5344CB8AC3E}">
-        <p14:creationId xmlns:p14="http://schemas.microsoft.com/office/powerpoint/2010/main" val="1373477060"/>
-      </p:ext>
-    </p:extLst>
   </p:cSld>
   <p:clrMapOvr>
     <a:masterClrMapping/>
@@ -1700,7 +1663,7 @@
               <a:rPr lang="en-US" smtClean="0"/>
               <a:t>Click to edit Master title style</a:t>
             </a:r>
-            <a:endParaRPr lang="en-US"/>
+            <a:endParaRPr lang="en-US" dirty="0"/>
           </a:p>
         </p:txBody>
       </p:sp>
@@ -1770,11 +1733,6 @@
         </p:txBody>
       </p:sp>
     </p:spTree>
-    <p:extLst>
-      <p:ext uri="{BB962C8B-B14F-4D97-AF65-F5344CB8AC3E}">
-        <p14:creationId xmlns:p14="http://schemas.microsoft.com/office/powerpoint/2010/main" val="727225817"/>
-      </p:ext>
-    </p:extLst>
   </p:cSld>
   <p:clrMapOvr>
     <a:masterClrMapping/>
@@ -1865,11 +1823,6 @@
         </p:txBody>
       </p:sp>
     </p:spTree>
-    <p:extLst>
-      <p:ext uri="{BB962C8B-B14F-4D97-AF65-F5344CB8AC3E}">
-        <p14:creationId xmlns:p14="http://schemas.microsoft.com/office/powerpoint/2010/main" val="1154871242"/>
-      </p:ext>
-    </p:extLst>
   </p:cSld>
   <p:clrMapOvr>
     <a:masterClrMapping/>
@@ -1906,15 +1859,15 @@
         </p:nvSpPr>
         <p:spPr>
           <a:xfrm>
-            <a:off x="839788" y="457200"/>
-            <a:ext cx="3932237" cy="1600200"/>
+            <a:off x="743890" y="479954"/>
+            <a:ext cx="3483205" cy="1679840"/>
           </a:xfrm>
         </p:spPr>
         <p:txBody>
           <a:bodyPr anchor="b"/>
           <a:lstStyle>
             <a:lvl1pPr>
-              <a:defRPr sz="3200"/>
+              <a:defRPr sz="3359"/>
             </a:lvl1pPr>
           </a:lstStyle>
           <a:p>
@@ -1922,7 +1875,7 @@
               <a:rPr lang="en-US" smtClean="0"/>
               <a:t>Click to edit Master title style</a:t>
             </a:r>
-            <a:endParaRPr lang="en-US"/>
+            <a:endParaRPr lang="en-US" dirty="0"/>
           </a:p>
         </p:txBody>
       </p:sp>
@@ -1938,39 +1891,39 @@
         </p:nvSpPr>
         <p:spPr>
           <a:xfrm>
-            <a:off x="5183188" y="987425"/>
-            <a:ext cx="6172200" cy="4873625"/>
+            <a:off x="4591306" y="1036570"/>
+            <a:ext cx="5467380" cy="5116178"/>
           </a:xfrm>
         </p:spPr>
         <p:txBody>
           <a:bodyPr/>
           <a:lstStyle>
             <a:lvl1pPr>
-              <a:defRPr sz="3200"/>
+              <a:defRPr sz="3359"/>
             </a:lvl1pPr>
             <a:lvl2pPr>
-              <a:defRPr sz="2800"/>
+              <a:defRPr sz="2939"/>
             </a:lvl2pPr>
             <a:lvl3pPr>
-              <a:defRPr sz="2400"/>
+              <a:defRPr sz="2520"/>
             </a:lvl3pPr>
             <a:lvl4pPr>
-              <a:defRPr sz="2000"/>
+              <a:defRPr sz="2100"/>
             </a:lvl4pPr>
             <a:lvl5pPr>
-              <a:defRPr sz="2000"/>
+              <a:defRPr sz="2100"/>
             </a:lvl5pPr>
             <a:lvl6pPr>
-              <a:defRPr sz="2000"/>
+              <a:defRPr sz="2100"/>
             </a:lvl6pPr>
             <a:lvl7pPr>
-              <a:defRPr sz="2000"/>
+              <a:defRPr sz="2100"/>
             </a:lvl7pPr>
             <a:lvl8pPr>
-              <a:defRPr sz="2000"/>
+              <a:defRPr sz="2100"/>
             </a:lvl8pPr>
             <a:lvl9pPr>
-              <a:defRPr sz="2000"/>
+              <a:defRPr sz="2100"/>
             </a:lvl9pPr>
           </a:lstStyle>
           <a:p>
@@ -2007,7 +1960,7 @@
               <a:rPr lang="en-US" smtClean="0"/>
               <a:t>Fifth level</a:t>
             </a:r>
-            <a:endParaRPr lang="en-US"/>
+            <a:endParaRPr lang="en-US" dirty="0"/>
           </a:p>
         </p:txBody>
       </p:sp>
@@ -2023,8 +1976,8 @@
         </p:nvSpPr>
         <p:spPr>
           <a:xfrm>
-            <a:off x="839788" y="2057400"/>
-            <a:ext cx="3932237" cy="3811588"/>
+            <a:off x="743890" y="2159794"/>
+            <a:ext cx="3483205" cy="4001285"/>
           </a:xfrm>
         </p:spPr>
         <p:txBody>
@@ -2032,39 +1985,39 @@
           <a:lstStyle>
             <a:lvl1pPr marL="0" indent="0">
               <a:buNone/>
-              <a:defRPr sz="1600"/>
+              <a:defRPr sz="1680"/>
             </a:lvl1pPr>
-            <a:lvl2pPr marL="457200" indent="0">
-              <a:buNone/>
-              <a:defRPr sz="1400"/>
+            <a:lvl2pPr marL="479969" indent="0">
+              <a:buNone/>
+              <a:defRPr sz="1470"/>
             </a:lvl2pPr>
-            <a:lvl3pPr marL="914400" indent="0">
-              <a:buNone/>
-              <a:defRPr sz="1200"/>
+            <a:lvl3pPr marL="959937" indent="0">
+              <a:buNone/>
+              <a:defRPr sz="1260"/>
             </a:lvl3pPr>
-            <a:lvl4pPr marL="1371600" indent="0">
-              <a:buNone/>
-              <a:defRPr sz="1000"/>
+            <a:lvl4pPr marL="1439906" indent="0">
+              <a:buNone/>
+              <a:defRPr sz="1050"/>
             </a:lvl4pPr>
-            <a:lvl5pPr marL="1828800" indent="0">
-              <a:buNone/>
-              <a:defRPr sz="1000"/>
+            <a:lvl5pPr marL="1919874" indent="0">
+              <a:buNone/>
+              <a:defRPr sz="1050"/>
             </a:lvl5pPr>
-            <a:lvl6pPr marL="2286000" indent="0">
-              <a:buNone/>
-              <a:defRPr sz="1000"/>
+            <a:lvl6pPr marL="2399843" indent="0">
+              <a:buNone/>
+              <a:defRPr sz="1050"/>
             </a:lvl6pPr>
-            <a:lvl7pPr marL="2743200" indent="0">
-              <a:buNone/>
-              <a:defRPr sz="1000"/>
+            <a:lvl7pPr marL="2879811" indent="0">
+              <a:buNone/>
+              <a:defRPr sz="1050"/>
             </a:lvl7pPr>
-            <a:lvl8pPr marL="3200400" indent="0">
-              <a:buNone/>
-              <a:defRPr sz="1000"/>
+            <a:lvl8pPr marL="3359780" indent="0">
+              <a:buNone/>
+              <a:defRPr sz="1050"/>
             </a:lvl8pPr>
-            <a:lvl9pPr marL="3657600" indent="0">
-              <a:buNone/>
-              <a:defRPr sz="1000"/>
+            <a:lvl9pPr marL="3839748" indent="0">
+              <a:buNone/>
+              <a:defRPr sz="1050"/>
             </a:lvl9pPr>
           </a:lstStyle>
           <a:p>
@@ -2142,11 +2095,6 @@
         </p:txBody>
       </p:sp>
     </p:spTree>
-    <p:extLst>
-      <p:ext uri="{BB962C8B-B14F-4D97-AF65-F5344CB8AC3E}">
-        <p14:creationId xmlns:p14="http://schemas.microsoft.com/office/powerpoint/2010/main" val="963762708"/>
-      </p:ext>
-    </p:extLst>
   </p:cSld>
   <p:clrMapOvr>
     <a:masterClrMapping/>
@@ -2183,15 +2131,15 @@
         </p:nvSpPr>
         <p:spPr>
           <a:xfrm>
-            <a:off x="839788" y="457200"/>
-            <a:ext cx="3932237" cy="1600200"/>
+            <a:off x="743890" y="479954"/>
+            <a:ext cx="3483205" cy="1679840"/>
           </a:xfrm>
         </p:spPr>
         <p:txBody>
           <a:bodyPr anchor="b"/>
           <a:lstStyle>
             <a:lvl1pPr>
-              <a:defRPr sz="3200"/>
+              <a:defRPr sz="3359"/>
             </a:lvl1pPr>
           </a:lstStyle>
           <a:p>
@@ -2199,7 +2147,7 @@
               <a:rPr lang="en-US" smtClean="0"/>
               <a:t>Click to edit Master title style</a:t>
             </a:r>
-            <a:endParaRPr lang="en-US"/>
+            <a:endParaRPr lang="en-US" dirty="0"/>
           </a:p>
         </p:txBody>
       </p:sp>
@@ -2207,7 +2155,7 @@
         <p:nvSpPr>
           <p:cNvPr id="3" name="Picture Placeholder 2"/>
           <p:cNvSpPr>
-            <a:spLocks noGrp="1"/>
+            <a:spLocks noGrp="1" noChangeAspect="1"/>
           </p:cNvSpPr>
           <p:nvPr>
             <p:ph type="pic" idx="1"/>
@@ -2215,52 +2163,56 @@
         </p:nvSpPr>
         <p:spPr>
           <a:xfrm>
-            <a:off x="5183188" y="987425"/>
-            <a:ext cx="6172200" cy="4873625"/>
+            <a:off x="4591306" y="1036570"/>
+            <a:ext cx="5467380" cy="5116178"/>
           </a:xfrm>
         </p:spPr>
         <p:txBody>
-          <a:bodyPr/>
+          <a:bodyPr anchor="t"/>
           <a:lstStyle>
             <a:lvl1pPr marL="0" indent="0">
               <a:buNone/>
-              <a:defRPr sz="3200"/>
+              <a:defRPr sz="3359"/>
             </a:lvl1pPr>
-            <a:lvl2pPr marL="457200" indent="0">
-              <a:buNone/>
-              <a:defRPr sz="2800"/>
+            <a:lvl2pPr marL="479969" indent="0">
+              <a:buNone/>
+              <a:defRPr sz="2939"/>
             </a:lvl2pPr>
-            <a:lvl3pPr marL="914400" indent="0">
-              <a:buNone/>
-              <a:defRPr sz="2400"/>
+            <a:lvl3pPr marL="959937" indent="0">
+              <a:buNone/>
+              <a:defRPr sz="2520"/>
             </a:lvl3pPr>
-            <a:lvl4pPr marL="1371600" indent="0">
-              <a:buNone/>
-              <a:defRPr sz="2000"/>
+            <a:lvl4pPr marL="1439906" indent="0">
+              <a:buNone/>
+              <a:defRPr sz="2100"/>
             </a:lvl4pPr>
-            <a:lvl5pPr marL="1828800" indent="0">
-              <a:buNone/>
-              <a:defRPr sz="2000"/>
+            <a:lvl5pPr marL="1919874" indent="0">
+              <a:buNone/>
+              <a:defRPr sz="2100"/>
             </a:lvl5pPr>
-            <a:lvl6pPr marL="2286000" indent="0">
-              <a:buNone/>
-              <a:defRPr sz="2000"/>
+            <a:lvl6pPr marL="2399843" indent="0">
+              <a:buNone/>
+              <a:defRPr sz="2100"/>
             </a:lvl6pPr>
-            <a:lvl7pPr marL="2743200" indent="0">
-              <a:buNone/>
-              <a:defRPr sz="2000"/>
+            <a:lvl7pPr marL="2879811" indent="0">
+              <a:buNone/>
+              <a:defRPr sz="2100"/>
             </a:lvl7pPr>
-            <a:lvl8pPr marL="3200400" indent="0">
-              <a:buNone/>
-              <a:defRPr sz="2000"/>
+            <a:lvl8pPr marL="3359780" indent="0">
+              <a:buNone/>
+              <a:defRPr sz="2100"/>
             </a:lvl8pPr>
-            <a:lvl9pPr marL="3657600" indent="0">
-              <a:buNone/>
-              <a:defRPr sz="2000"/>
+            <a:lvl9pPr marL="3839748" indent="0">
+              <a:buNone/>
+              <a:defRPr sz="2100"/>
             </a:lvl9pPr>
           </a:lstStyle>
           <a:p>
-            <a:endParaRPr lang="en-US"/>
+            <a:r>
+              <a:rPr lang="en-US" smtClean="0"/>
+              <a:t>Drag picture to placeholder or click icon to add</a:t>
+            </a:r>
+            <a:endParaRPr lang="en-US" dirty="0"/>
           </a:p>
         </p:txBody>
       </p:sp>
@@ -2276,8 +2228,8 @@
         </p:nvSpPr>
         <p:spPr>
           <a:xfrm>
-            <a:off x="839788" y="2057400"/>
-            <a:ext cx="3932237" cy="3811588"/>
+            <a:off x="743890" y="2159794"/>
+            <a:ext cx="3483205" cy="4001285"/>
           </a:xfrm>
         </p:spPr>
         <p:txBody>
@@ -2285,39 +2237,39 @@
           <a:lstStyle>
             <a:lvl1pPr marL="0" indent="0">
               <a:buNone/>
-              <a:defRPr sz="1600"/>
+              <a:defRPr sz="1680"/>
             </a:lvl1pPr>
-            <a:lvl2pPr marL="457200" indent="0">
-              <a:buNone/>
-              <a:defRPr sz="1400"/>
+            <a:lvl2pPr marL="479969" indent="0">
+              <a:buNone/>
+              <a:defRPr sz="1470"/>
             </a:lvl2pPr>
-            <a:lvl3pPr marL="914400" indent="0">
-              <a:buNone/>
-              <a:defRPr sz="1200"/>
+            <a:lvl3pPr marL="959937" indent="0">
+              <a:buNone/>
+              <a:defRPr sz="1260"/>
             </a:lvl3pPr>
-            <a:lvl4pPr marL="1371600" indent="0">
-              <a:buNone/>
-              <a:defRPr sz="1000"/>
+            <a:lvl4pPr marL="1439906" indent="0">
+              <a:buNone/>
+              <a:defRPr sz="1050"/>
             </a:lvl4pPr>
-            <a:lvl5pPr marL="1828800" indent="0">
-              <a:buNone/>
-              <a:defRPr sz="1000"/>
+            <a:lvl5pPr marL="1919874" indent="0">
+              <a:buNone/>
+              <a:defRPr sz="1050"/>
             </a:lvl5pPr>
-            <a:lvl6pPr marL="2286000" indent="0">
-              <a:buNone/>
-              <a:defRPr sz="1000"/>
+            <a:lvl6pPr marL="2399843" indent="0">
+              <a:buNone/>
+              <a:defRPr sz="1050"/>
             </a:lvl6pPr>
-            <a:lvl7pPr marL="2743200" indent="0">
-              <a:buNone/>
-              <a:defRPr sz="1000"/>
+            <a:lvl7pPr marL="2879811" indent="0">
+              <a:buNone/>
+              <a:defRPr sz="1050"/>
             </a:lvl7pPr>
-            <a:lvl8pPr marL="3200400" indent="0">
-              <a:buNone/>
-              <a:defRPr sz="1000"/>
+            <a:lvl8pPr marL="3359780" indent="0">
+              <a:buNone/>
+              <a:defRPr sz="1050"/>
             </a:lvl8pPr>
-            <a:lvl9pPr marL="3657600" indent="0">
-              <a:buNone/>
-              <a:defRPr sz="1000"/>
+            <a:lvl9pPr marL="3839748" indent="0">
+              <a:buNone/>
+              <a:defRPr sz="1050"/>
             </a:lvl9pPr>
           </a:lstStyle>
           <a:p>
@@ -2395,11 +2347,6 @@
         </p:txBody>
       </p:sp>
     </p:spTree>
-    <p:extLst>
-      <p:ext uri="{BB962C8B-B14F-4D97-AF65-F5344CB8AC3E}">
-        <p14:creationId xmlns:p14="http://schemas.microsoft.com/office/powerpoint/2010/main" val="1638167682"/>
-      </p:ext>
-    </p:extLst>
   </p:cSld>
   <p:clrMapOvr>
     <a:masterClrMapping/>
@@ -2441,8 +2388,8 @@
         </p:nvSpPr>
         <p:spPr>
           <a:xfrm>
-            <a:off x="838200" y="365125"/>
-            <a:ext cx="10515600" cy="1325563"/>
+            <a:off x="742484" y="383299"/>
+            <a:ext cx="9314796" cy="1391534"/>
           </a:xfrm>
           <a:prstGeom prst="rect">
             <a:avLst/>
@@ -2458,7 +2405,7 @@
               <a:rPr lang="en-US" smtClean="0"/>
               <a:t>Click to edit Master title style</a:t>
             </a:r>
-            <a:endParaRPr lang="en-US"/>
+            <a:endParaRPr lang="en-US" dirty="0"/>
           </a:p>
         </p:txBody>
       </p:sp>
@@ -2474,8 +2421,8 @@
         </p:nvSpPr>
         <p:spPr>
           <a:xfrm>
-            <a:off x="838200" y="1825625"/>
-            <a:ext cx="10515600" cy="4351338"/>
+            <a:off x="742484" y="1916484"/>
+            <a:ext cx="9314796" cy="4567898"/>
           </a:xfrm>
           <a:prstGeom prst="rect">
             <a:avLst/>
@@ -2520,7 +2467,7 @@
               <a:rPr lang="en-US" smtClean="0"/>
               <a:t>Fifth level</a:t>
             </a:r>
-            <a:endParaRPr lang="en-US"/>
+            <a:endParaRPr lang="en-US" dirty="0"/>
           </a:p>
         </p:txBody>
       </p:sp>
@@ -2536,8 +2483,8 @@
         </p:nvSpPr>
         <p:spPr>
           <a:xfrm>
-            <a:off x="838200" y="6356350"/>
-            <a:ext cx="2743200" cy="365125"/>
+            <a:off x="742484" y="6672698"/>
+            <a:ext cx="2429947" cy="383297"/>
           </a:xfrm>
           <a:prstGeom prst="rect">
             <a:avLst/>
@@ -2547,7 +2494,7 @@
           <a:bodyPr vert="horz" lIns="91440" tIns="45720" rIns="91440" bIns="45720" rtlCol="0" anchor="ctr"/>
           <a:lstStyle>
             <a:lvl1pPr algn="l">
-              <a:defRPr sz="1200">
+              <a:defRPr sz="1260">
                 <a:solidFill>
                   <a:schemeClr val="tx1">
                     <a:tint val="75000"/>
@@ -2577,8 +2524,8 @@
         </p:nvSpPr>
         <p:spPr>
           <a:xfrm>
-            <a:off x="4038600" y="6356350"/>
-            <a:ext cx="4114800" cy="365125"/>
+            <a:off x="3577422" y="6672698"/>
+            <a:ext cx="3644920" cy="383297"/>
           </a:xfrm>
           <a:prstGeom prst="rect">
             <a:avLst/>
@@ -2588,7 +2535,7 @@
           <a:bodyPr vert="horz" lIns="91440" tIns="45720" rIns="91440" bIns="45720" rtlCol="0" anchor="ctr"/>
           <a:lstStyle>
             <a:lvl1pPr algn="ctr">
-              <a:defRPr sz="1200">
+              <a:defRPr sz="1260">
                 <a:solidFill>
                   <a:schemeClr val="tx1">
                     <a:tint val="75000"/>
@@ -2614,8 +2561,8 @@
         </p:nvSpPr>
         <p:spPr>
           <a:xfrm>
-            <a:off x="8610600" y="6356350"/>
-            <a:ext cx="2743200" cy="365125"/>
+            <a:off x="7627332" y="6672698"/>
+            <a:ext cx="2429947" cy="383297"/>
           </a:xfrm>
           <a:prstGeom prst="rect">
             <a:avLst/>
@@ -2625,7 +2572,7 @@
           <a:bodyPr vert="horz" lIns="91440" tIns="45720" rIns="91440" bIns="45720" rtlCol="0" anchor="ctr"/>
           <a:lstStyle>
             <a:lvl1pPr algn="r">
-              <a:defRPr sz="1200">
+              <a:defRPr sz="1260">
                 <a:solidFill>
                   <a:schemeClr val="tx1">
                     <a:tint val="75000"/>
@@ -2646,27 +2593,27 @@
     </p:spTree>
     <p:extLst>
       <p:ext uri="{BB962C8B-B14F-4D97-AF65-F5344CB8AC3E}">
-        <p14:creationId xmlns:p14="http://schemas.microsoft.com/office/powerpoint/2010/main" val="990651477"/>
+        <p14:creationId xmlns:p14="http://schemas.microsoft.com/office/powerpoint/2010/main" val="1925192167"/>
       </p:ext>
     </p:extLst>
   </p:cSld>
   <p:clrMap bg1="lt1" tx1="dk1" bg2="lt2" tx2="dk2" accent1="accent1" accent2="accent2" accent3="accent3" accent4="accent4" accent5="accent5" accent6="accent6" hlink="hlink" folHlink="folHlink"/>
   <p:sldLayoutIdLst>
-    <p:sldLayoutId id="2147483649" r:id="rId1"/>
-    <p:sldLayoutId id="2147483650" r:id="rId2"/>
-    <p:sldLayoutId id="2147483651" r:id="rId3"/>
-    <p:sldLayoutId id="2147483652" r:id="rId4"/>
-    <p:sldLayoutId id="2147483653" r:id="rId5"/>
-    <p:sldLayoutId id="2147483654" r:id="rId6"/>
-    <p:sldLayoutId id="2147483655" r:id="rId7"/>
-    <p:sldLayoutId id="2147483656" r:id="rId8"/>
-    <p:sldLayoutId id="2147483657" r:id="rId9"/>
-    <p:sldLayoutId id="2147483658" r:id="rId10"/>
-    <p:sldLayoutId id="2147483659" r:id="rId11"/>
+    <p:sldLayoutId id="2147483661" r:id="rId1"/>
+    <p:sldLayoutId id="2147483662" r:id="rId2"/>
+    <p:sldLayoutId id="2147483663" r:id="rId3"/>
+    <p:sldLayoutId id="2147483664" r:id="rId4"/>
+    <p:sldLayoutId id="2147483665" r:id="rId5"/>
+    <p:sldLayoutId id="2147483666" r:id="rId6"/>
+    <p:sldLayoutId id="2147483667" r:id="rId7"/>
+    <p:sldLayoutId id="2147483668" r:id="rId8"/>
+    <p:sldLayoutId id="2147483669" r:id="rId9"/>
+    <p:sldLayoutId id="2147483670" r:id="rId10"/>
+    <p:sldLayoutId id="2147483671" r:id="rId11"/>
   </p:sldLayoutIdLst>
   <p:txStyles>
     <p:titleStyle>
-      <a:lvl1pPr algn="l" defTabSz="914400" rtl="0" eaLnBrk="1" latinLnBrk="0" hangingPunct="1">
+      <a:lvl1pPr algn="l" defTabSz="959937" rtl="0" eaLnBrk="1" latinLnBrk="0" hangingPunct="1">
         <a:lnSpc>
           <a:spcPct val="90000"/>
         </a:lnSpc>
@@ -2674,7 +2621,7 @@
           <a:spcPct val="0"/>
         </a:spcBef>
         <a:buNone/>
-        <a:defRPr sz="4400" kern="1200">
+        <a:defRPr sz="4619" kern="1200">
           <a:solidFill>
             <a:schemeClr val="tx1"/>
           </a:solidFill>
@@ -2685,16 +2632,16 @@
       </a:lvl1pPr>
     </p:titleStyle>
     <p:bodyStyle>
-      <a:lvl1pPr marL="228600" indent="-228600" algn="l" defTabSz="914400" rtl="0" eaLnBrk="1" latinLnBrk="0" hangingPunct="1">
+      <a:lvl1pPr marL="239984" indent="-239984" algn="l" defTabSz="959937" rtl="0" eaLnBrk="1" latinLnBrk="0" hangingPunct="1">
         <a:lnSpc>
           <a:spcPct val="90000"/>
         </a:lnSpc>
         <a:spcBef>
-          <a:spcPts val="1000"/>
+          <a:spcPts val="1050"/>
         </a:spcBef>
-        <a:buFont typeface="Arial"/>
+        <a:buFont typeface="Arial" panose="020B0604020202020204" pitchFamily="34" charset="0"/>
         <a:buChar char="•"/>
-        <a:defRPr sz="2800" kern="1200">
+        <a:defRPr sz="2939" kern="1200">
           <a:solidFill>
             <a:schemeClr val="tx1"/>
           </a:solidFill>
@@ -2703,16 +2650,16 @@
           <a:cs typeface="+mn-cs"/>
         </a:defRPr>
       </a:lvl1pPr>
-      <a:lvl2pPr marL="685800" indent="-228600" algn="l" defTabSz="914400" rtl="0" eaLnBrk="1" latinLnBrk="0" hangingPunct="1">
+      <a:lvl2pPr marL="719953" indent="-239984" algn="l" defTabSz="959937" rtl="0" eaLnBrk="1" latinLnBrk="0" hangingPunct="1">
         <a:lnSpc>
           <a:spcPct val="90000"/>
         </a:lnSpc>
         <a:spcBef>
-          <a:spcPts val="500"/>
+          <a:spcPts val="525"/>
         </a:spcBef>
-        <a:buFont typeface="Arial"/>
+        <a:buFont typeface="Arial" panose="020B0604020202020204" pitchFamily="34" charset="0"/>
         <a:buChar char="•"/>
-        <a:defRPr sz="2400" kern="1200">
+        <a:defRPr sz="2520" kern="1200">
           <a:solidFill>
             <a:schemeClr val="tx1"/>
           </a:solidFill>
@@ -2721,16 +2668,16 @@
           <a:cs typeface="+mn-cs"/>
         </a:defRPr>
       </a:lvl2pPr>
-      <a:lvl3pPr marL="1143000" indent="-228600" algn="l" defTabSz="914400" rtl="0" eaLnBrk="1" latinLnBrk="0" hangingPunct="1">
+      <a:lvl3pPr marL="1199921" indent="-239984" algn="l" defTabSz="959937" rtl="0" eaLnBrk="1" latinLnBrk="0" hangingPunct="1">
         <a:lnSpc>
           <a:spcPct val="90000"/>
         </a:lnSpc>
         <a:spcBef>
-          <a:spcPts val="500"/>
+          <a:spcPts val="525"/>
         </a:spcBef>
-        <a:buFont typeface="Arial"/>
+        <a:buFont typeface="Arial" panose="020B0604020202020204" pitchFamily="34" charset="0"/>
         <a:buChar char="•"/>
-        <a:defRPr sz="2000" kern="1200">
+        <a:defRPr sz="2100" kern="1200">
           <a:solidFill>
             <a:schemeClr val="tx1"/>
           </a:solidFill>
@@ -2739,16 +2686,16 @@
           <a:cs typeface="+mn-cs"/>
         </a:defRPr>
       </a:lvl3pPr>
-      <a:lvl4pPr marL="1600200" indent="-228600" algn="l" defTabSz="914400" rtl="0" eaLnBrk="1" latinLnBrk="0" hangingPunct="1">
+      <a:lvl4pPr marL="1679890" indent="-239984" algn="l" defTabSz="959937" rtl="0" eaLnBrk="1" latinLnBrk="0" hangingPunct="1">
         <a:lnSpc>
           <a:spcPct val="90000"/>
         </a:lnSpc>
         <a:spcBef>
-          <a:spcPts val="500"/>
+          <a:spcPts val="525"/>
         </a:spcBef>
-        <a:buFont typeface="Arial"/>
+        <a:buFont typeface="Arial" panose="020B0604020202020204" pitchFamily="34" charset="0"/>
         <a:buChar char="•"/>
-        <a:defRPr sz="1800" kern="1200">
+        <a:defRPr sz="1890" kern="1200">
           <a:solidFill>
             <a:schemeClr val="tx1"/>
           </a:solidFill>
@@ -2757,16 +2704,16 @@
           <a:cs typeface="+mn-cs"/>
         </a:defRPr>
       </a:lvl4pPr>
-      <a:lvl5pPr marL="2057400" indent="-228600" algn="l" defTabSz="914400" rtl="0" eaLnBrk="1" latinLnBrk="0" hangingPunct="1">
+      <a:lvl5pPr marL="2159859" indent="-239984" algn="l" defTabSz="959937" rtl="0" eaLnBrk="1" latinLnBrk="0" hangingPunct="1">
         <a:lnSpc>
           <a:spcPct val="90000"/>
         </a:lnSpc>
         <a:spcBef>
-          <a:spcPts val="500"/>
+          <a:spcPts val="525"/>
         </a:spcBef>
-        <a:buFont typeface="Arial"/>
+        <a:buFont typeface="Arial" panose="020B0604020202020204" pitchFamily="34" charset="0"/>
         <a:buChar char="•"/>
-        <a:defRPr sz="1800" kern="1200">
+        <a:defRPr sz="1890" kern="1200">
           <a:solidFill>
             <a:schemeClr val="tx1"/>
           </a:solidFill>
@@ -2775,16 +2722,16 @@
           <a:cs typeface="+mn-cs"/>
         </a:defRPr>
       </a:lvl5pPr>
-      <a:lvl6pPr marL="2514600" indent="-228600" algn="l" defTabSz="914400" rtl="0" eaLnBrk="1" latinLnBrk="0" hangingPunct="1">
+      <a:lvl6pPr marL="2639827" indent="-239984" algn="l" defTabSz="959937" rtl="0" eaLnBrk="1" latinLnBrk="0" hangingPunct="1">
         <a:lnSpc>
           <a:spcPct val="90000"/>
         </a:lnSpc>
         <a:spcBef>
-          <a:spcPts val="500"/>
+          <a:spcPts val="525"/>
         </a:spcBef>
-        <a:buFont typeface="Arial"/>
+        <a:buFont typeface="Arial" panose="020B0604020202020204" pitchFamily="34" charset="0"/>
         <a:buChar char="•"/>
-        <a:defRPr sz="1800" kern="1200">
+        <a:defRPr sz="1890" kern="1200">
           <a:solidFill>
             <a:schemeClr val="tx1"/>
           </a:solidFill>
@@ -2793,16 +2740,16 @@
           <a:cs typeface="+mn-cs"/>
         </a:defRPr>
       </a:lvl6pPr>
-      <a:lvl7pPr marL="2971800" indent="-228600" algn="l" defTabSz="914400" rtl="0" eaLnBrk="1" latinLnBrk="0" hangingPunct="1">
+      <a:lvl7pPr marL="3119796" indent="-239984" algn="l" defTabSz="959937" rtl="0" eaLnBrk="1" latinLnBrk="0" hangingPunct="1">
         <a:lnSpc>
           <a:spcPct val="90000"/>
         </a:lnSpc>
         <a:spcBef>
-          <a:spcPts val="500"/>
+          <a:spcPts val="525"/>
         </a:spcBef>
-        <a:buFont typeface="Arial"/>
+        <a:buFont typeface="Arial" panose="020B0604020202020204" pitchFamily="34" charset="0"/>
         <a:buChar char="•"/>
-        <a:defRPr sz="1800" kern="1200">
+        <a:defRPr sz="1890" kern="1200">
           <a:solidFill>
             <a:schemeClr val="tx1"/>
           </a:solidFill>
@@ -2811,16 +2758,16 @@
           <a:cs typeface="+mn-cs"/>
         </a:defRPr>
       </a:lvl7pPr>
-      <a:lvl8pPr marL="3429000" indent="-228600" algn="l" defTabSz="914400" rtl="0" eaLnBrk="1" latinLnBrk="0" hangingPunct="1">
+      <a:lvl8pPr marL="3599764" indent="-239984" algn="l" defTabSz="959937" rtl="0" eaLnBrk="1" latinLnBrk="0" hangingPunct="1">
         <a:lnSpc>
           <a:spcPct val="90000"/>
         </a:lnSpc>
         <a:spcBef>
-          <a:spcPts val="500"/>
+          <a:spcPts val="525"/>
         </a:spcBef>
-        <a:buFont typeface="Arial"/>
+        <a:buFont typeface="Arial" panose="020B0604020202020204" pitchFamily="34" charset="0"/>
         <a:buChar char="•"/>
-        <a:defRPr sz="1800" kern="1200">
+        <a:defRPr sz="1890" kern="1200">
           <a:solidFill>
             <a:schemeClr val="tx1"/>
           </a:solidFill>
@@ -2829,16 +2776,16 @@
           <a:cs typeface="+mn-cs"/>
         </a:defRPr>
       </a:lvl8pPr>
-      <a:lvl9pPr marL="3886200" indent="-228600" algn="l" defTabSz="914400" rtl="0" eaLnBrk="1" latinLnBrk="0" hangingPunct="1">
+      <a:lvl9pPr marL="4079733" indent="-239984" algn="l" defTabSz="959937" rtl="0" eaLnBrk="1" latinLnBrk="0" hangingPunct="1">
         <a:lnSpc>
           <a:spcPct val="90000"/>
         </a:lnSpc>
         <a:spcBef>
-          <a:spcPts val="500"/>
+          <a:spcPts val="525"/>
         </a:spcBef>
-        <a:buFont typeface="Arial"/>
+        <a:buFont typeface="Arial" panose="020B0604020202020204" pitchFamily="34" charset="0"/>
         <a:buChar char="•"/>
-        <a:defRPr sz="1800" kern="1200">
+        <a:defRPr sz="1890" kern="1200">
           <a:solidFill>
             <a:schemeClr val="tx1"/>
           </a:solidFill>
@@ -2852,8 +2799,8 @@
       <a:defPPr>
         <a:defRPr lang="en-US"/>
       </a:defPPr>
-      <a:lvl1pPr marL="0" algn="l" defTabSz="914400" rtl="0" eaLnBrk="1" latinLnBrk="0" hangingPunct="1">
-        <a:defRPr sz="1800" kern="1200">
+      <a:lvl1pPr marL="0" algn="l" defTabSz="959937" rtl="0" eaLnBrk="1" latinLnBrk="0" hangingPunct="1">
+        <a:defRPr sz="1890" kern="1200">
           <a:solidFill>
             <a:schemeClr val="tx1"/>
           </a:solidFill>
@@ -2862,8 +2809,8 @@
           <a:cs typeface="+mn-cs"/>
         </a:defRPr>
       </a:lvl1pPr>
-      <a:lvl2pPr marL="457200" algn="l" defTabSz="914400" rtl="0" eaLnBrk="1" latinLnBrk="0" hangingPunct="1">
-        <a:defRPr sz="1800" kern="1200">
+      <a:lvl2pPr marL="479969" algn="l" defTabSz="959937" rtl="0" eaLnBrk="1" latinLnBrk="0" hangingPunct="1">
+        <a:defRPr sz="1890" kern="1200">
           <a:solidFill>
             <a:schemeClr val="tx1"/>
           </a:solidFill>
@@ -2872,8 +2819,8 @@
           <a:cs typeface="+mn-cs"/>
         </a:defRPr>
       </a:lvl2pPr>
-      <a:lvl3pPr marL="914400" algn="l" defTabSz="914400" rtl="0" eaLnBrk="1" latinLnBrk="0" hangingPunct="1">
-        <a:defRPr sz="1800" kern="1200">
+      <a:lvl3pPr marL="959937" algn="l" defTabSz="959937" rtl="0" eaLnBrk="1" latinLnBrk="0" hangingPunct="1">
+        <a:defRPr sz="1890" kern="1200">
           <a:solidFill>
             <a:schemeClr val="tx1"/>
           </a:solidFill>
@@ -2882,8 +2829,8 @@
           <a:cs typeface="+mn-cs"/>
         </a:defRPr>
       </a:lvl3pPr>
-      <a:lvl4pPr marL="1371600" algn="l" defTabSz="914400" rtl="0" eaLnBrk="1" latinLnBrk="0" hangingPunct="1">
-        <a:defRPr sz="1800" kern="1200">
+      <a:lvl4pPr marL="1439906" algn="l" defTabSz="959937" rtl="0" eaLnBrk="1" latinLnBrk="0" hangingPunct="1">
+        <a:defRPr sz="1890" kern="1200">
           <a:solidFill>
             <a:schemeClr val="tx1"/>
           </a:solidFill>
@@ -2892,8 +2839,8 @@
           <a:cs typeface="+mn-cs"/>
         </a:defRPr>
       </a:lvl4pPr>
-      <a:lvl5pPr marL="1828800" algn="l" defTabSz="914400" rtl="0" eaLnBrk="1" latinLnBrk="0" hangingPunct="1">
-        <a:defRPr sz="1800" kern="1200">
+      <a:lvl5pPr marL="1919874" algn="l" defTabSz="959937" rtl="0" eaLnBrk="1" latinLnBrk="0" hangingPunct="1">
+        <a:defRPr sz="1890" kern="1200">
           <a:solidFill>
             <a:schemeClr val="tx1"/>
           </a:solidFill>
@@ -2902,8 +2849,8 @@
           <a:cs typeface="+mn-cs"/>
         </a:defRPr>
       </a:lvl5pPr>
-      <a:lvl6pPr marL="2286000" algn="l" defTabSz="914400" rtl="0" eaLnBrk="1" latinLnBrk="0" hangingPunct="1">
-        <a:defRPr sz="1800" kern="1200">
+      <a:lvl6pPr marL="2399843" algn="l" defTabSz="959937" rtl="0" eaLnBrk="1" latinLnBrk="0" hangingPunct="1">
+        <a:defRPr sz="1890" kern="1200">
           <a:solidFill>
             <a:schemeClr val="tx1"/>
           </a:solidFill>
@@ -2912,8 +2859,8 @@
           <a:cs typeface="+mn-cs"/>
         </a:defRPr>
       </a:lvl6pPr>
-      <a:lvl7pPr marL="2743200" algn="l" defTabSz="914400" rtl="0" eaLnBrk="1" latinLnBrk="0" hangingPunct="1">
-        <a:defRPr sz="1800" kern="1200">
+      <a:lvl7pPr marL="2879811" algn="l" defTabSz="959937" rtl="0" eaLnBrk="1" latinLnBrk="0" hangingPunct="1">
+        <a:defRPr sz="1890" kern="1200">
           <a:solidFill>
             <a:schemeClr val="tx1"/>
           </a:solidFill>
@@ -2922,8 +2869,8 @@
           <a:cs typeface="+mn-cs"/>
         </a:defRPr>
       </a:lvl7pPr>
-      <a:lvl8pPr marL="3200400" algn="l" defTabSz="914400" rtl="0" eaLnBrk="1" latinLnBrk="0" hangingPunct="1">
-        <a:defRPr sz="1800" kern="1200">
+      <a:lvl8pPr marL="3359780" algn="l" defTabSz="959937" rtl="0" eaLnBrk="1" latinLnBrk="0" hangingPunct="1">
+        <a:defRPr sz="1890" kern="1200">
           <a:solidFill>
             <a:schemeClr val="tx1"/>
           </a:solidFill>
@@ -2932,8 +2879,8 @@
           <a:cs typeface="+mn-cs"/>
         </a:defRPr>
       </a:lvl8pPr>
-      <a:lvl9pPr marL="3657600" algn="l" defTabSz="914400" rtl="0" eaLnBrk="1" latinLnBrk="0" hangingPunct="1">
-        <a:defRPr sz="1800" kern="1200">
+      <a:lvl9pPr marL="3839748" algn="l" defTabSz="959937" rtl="0" eaLnBrk="1" latinLnBrk="0" hangingPunct="1">
+        <a:defRPr sz="1890" kern="1200">
           <a:solidFill>
             <a:schemeClr val="tx1"/>
           </a:solidFill>
@@ -2950,6 +2897,14 @@
 <file path=ppt/slides/slide1.xml><?xml version="1.0" encoding="utf-8"?>
 <p:sld xmlns:a="http://schemas.openxmlformats.org/drawingml/2006/main" xmlns:r="http://schemas.openxmlformats.org/officeDocument/2006/relationships" xmlns:p="http://schemas.openxmlformats.org/presentationml/2006/main">
   <p:cSld>
+    <p:bg>
+      <p:bgPr>
+        <a:solidFill>
+          <a:srgbClr val="DF6355"/>
+        </a:solidFill>
+        <a:effectLst/>
+      </p:bgPr>
+    </p:bg>
     <p:spTree>
       <p:nvGrpSpPr>
         <p:cNvPr id="1" name=""/>
@@ -2986,8 +2941,8 @@
         </p:blipFill>
         <p:spPr>
           <a:xfrm>
-            <a:off x="-1" y="0"/>
-            <a:ext cx="12225889" cy="6858000"/>
+            <a:off x="0" y="499730"/>
+            <a:ext cx="10804272" cy="6060558"/>
           </a:xfrm>
           <a:prstGeom prst="rect">
             <a:avLst/>
@@ -3016,13 +2971,13 @@
         </p:blipFill>
         <p:spPr>
           <a:xfrm>
-            <a:off x="5573193" y="3018790"/>
-            <a:ext cx="1079500" cy="820420"/>
+            <a:off x="4851055" y="3169031"/>
+            <a:ext cx="1133225" cy="861251"/>
           </a:xfrm>
           <a:prstGeom prst="rect">
             <a:avLst/>
           </a:prstGeom>
-          <a:ln w="22225">
+          <a:ln w="34925">
             <a:solidFill>
               <a:schemeClr val="bg1"/>
             </a:solidFill>
@@ -3045,7 +3000,7 @@
 <file path=ppt/theme/theme1.xml><?xml version="1.0" encoding="utf-8"?>
 <a:theme xmlns:a="http://schemas.openxmlformats.org/drawingml/2006/main" name="Office Theme">
   <a:themeElements>
-    <a:clrScheme name="Office">
+    <a:clrScheme name="Office Theme">
       <a:dk1>
         <a:sysClr val="windowText" lastClr="000000"/>
       </a:dk1>
@@ -3083,14 +3038,14 @@
         <a:srgbClr val="954F72"/>
       </a:folHlink>
     </a:clrScheme>
-    <a:fontScheme name="Office">
+    <a:fontScheme name="Office Theme">
       <a:majorFont>
         <a:latin typeface="Calibri Light" panose="020F0302020204030204"/>
         <a:ea typeface=""/>
         <a:cs typeface=""/>
-        <a:font script="Jpan" typeface="Yu Gothic Light"/>
+        <a:font script="Jpan" typeface="游ゴシック Light"/>
         <a:font script="Hang" typeface="맑은 고딕"/>
-        <a:font script="Hans" typeface="DengXian Light"/>
+        <a:font script="Hans" typeface="等线 Light"/>
         <a:font script="Hant" typeface="新細明體"/>
         <a:font script="Arab" typeface="Times New Roman"/>
         <a:font script="Hebr" typeface="Times New Roman"/>
@@ -3123,9 +3078,9 @@
         <a:latin typeface="Calibri" panose="020F0502020204030204"/>
         <a:ea typeface=""/>
         <a:cs typeface=""/>
-        <a:font script="Jpan" typeface="Yu Gothic"/>
+        <a:font script="Jpan" typeface="游ゴシック"/>
         <a:font script="Hang" typeface="맑은 고딕"/>
-        <a:font script="Hans" typeface="DengXian"/>
+        <a:font script="Hans" typeface="等线"/>
         <a:font script="Hant" typeface="新細明體"/>
         <a:font script="Arab" typeface="Arial"/>
         <a:font script="Hebr" typeface="Arial"/>
@@ -3155,7 +3110,7 @@
         <a:font script="Geor" typeface="Sylfaen"/>
       </a:minorFont>
     </a:fontScheme>
-    <a:fmtScheme name="Office">
+    <a:fmtScheme name="Office Theme">
       <a:fillStyleLst>
         <a:solidFill>
           <a:schemeClr val="phClr"/>

</xml_diff>

<commit_message>
new data on mortality webpage
</commit_message>
<xml_diff>
--- a/img/creation_img_video.pptx
+++ b/img/creation_img_video.pptx
@@ -5,11 +5,12 @@
     <p:sldMasterId id="2147483660" r:id="rId1"/>
   </p:sldMasterIdLst>
   <p:notesMasterIdLst>
-    <p:notesMasterId r:id="rId4"/>
+    <p:notesMasterId r:id="rId5"/>
   </p:notesMasterIdLst>
   <p:sldIdLst>
     <p:sldId id="256" r:id="rId2"/>
     <p:sldId id="257" r:id="rId3"/>
+    <p:sldId id="258" r:id="rId4"/>
   </p:sldIdLst>
   <p:sldSz cx="10799763" cy="7199313"/>
   <p:notesSz cx="6858000" cy="9144000"/>
@@ -198,7 +199,7 @@
           <a:p>
             <a:fld id="{2388F809-D495-C740-BE32-70CB40C78ADF}" type="datetimeFigureOut">
               <a:rPr lang="en-AU" smtClean="0"/>
-              <a:t>6/12/18</a:t>
+              <a:t>25/10/19</a:t>
             </a:fld>
             <a:endParaRPr lang="en-AU"/>
           </a:p>
@@ -262,35 +263,35 @@
           <a:p>
             <a:pPr lvl="0"/>
             <a:r>
-              <a:rPr lang="en-US" smtClean="0"/>
+              <a:rPr lang="en-US"/>
               <a:t>Click to edit Master text styles</a:t>
             </a:r>
           </a:p>
           <a:p>
             <a:pPr lvl="1"/>
             <a:r>
-              <a:rPr lang="en-US" smtClean="0"/>
+              <a:rPr lang="en-US"/>
               <a:t>Second level</a:t>
             </a:r>
           </a:p>
           <a:p>
             <a:pPr lvl="2"/>
             <a:r>
-              <a:rPr lang="en-US" smtClean="0"/>
+              <a:rPr lang="en-US"/>
               <a:t>Third level</a:t>
             </a:r>
           </a:p>
           <a:p>
             <a:pPr lvl="3"/>
             <a:r>
-              <a:rPr lang="en-US" smtClean="0"/>
+              <a:rPr lang="en-US"/>
               <a:t>Fourth level</a:t>
             </a:r>
           </a:p>
           <a:p>
             <a:pPr lvl="4"/>
             <a:r>
-              <a:rPr lang="en-US" smtClean="0"/>
+              <a:rPr lang="en-US"/>
               <a:t>Fifth level</a:t>
             </a:r>
             <a:endParaRPr lang="en-AU"/>
@@ -466,6 +467,90 @@
 </p:notesMaster>
 </file>
 
+<file path=ppt/notesSlides/notesSlide1.xml><?xml version="1.0" encoding="utf-8"?>
+<p:notes xmlns:a="http://schemas.openxmlformats.org/drawingml/2006/main" xmlns:r="http://schemas.openxmlformats.org/officeDocument/2006/relationships" xmlns:p="http://schemas.openxmlformats.org/presentationml/2006/main">
+  <p:cSld>
+    <p:spTree>
+      <p:nvGrpSpPr>
+        <p:cNvPr id="1" name=""/>
+        <p:cNvGrpSpPr/>
+        <p:nvPr/>
+      </p:nvGrpSpPr>
+      <p:grpSpPr>
+        <a:xfrm>
+          <a:off x="0" y="0"/>
+          <a:ext cx="0" cy="0"/>
+          <a:chOff x="0" y="0"/>
+          <a:chExt cx="0" cy="0"/>
+        </a:xfrm>
+      </p:grpSpPr>
+      <p:sp>
+        <p:nvSpPr>
+          <p:cNvPr id="2" name="Slide Image Placeholder 1"/>
+          <p:cNvSpPr>
+            <a:spLocks noGrp="1" noRot="1" noChangeAspect="1"/>
+          </p:cNvSpPr>
+          <p:nvPr>
+            <p:ph type="sldImg"/>
+          </p:nvPr>
+        </p:nvSpPr>
+        <p:spPr/>
+      </p:sp>
+      <p:sp>
+        <p:nvSpPr>
+          <p:cNvPr id="3" name="Notes Placeholder 2"/>
+          <p:cNvSpPr>
+            <a:spLocks noGrp="1"/>
+          </p:cNvSpPr>
+          <p:nvPr>
+            <p:ph type="body" idx="1"/>
+          </p:nvPr>
+        </p:nvSpPr>
+        <p:spPr/>
+        <p:txBody>
+          <a:bodyPr/>
+          <a:lstStyle/>
+          <a:p>
+            <a:endParaRPr lang="fr-FR" dirty="0"/>
+          </a:p>
+        </p:txBody>
+      </p:sp>
+      <p:sp>
+        <p:nvSpPr>
+          <p:cNvPr id="4" name="Slide Number Placeholder 3"/>
+          <p:cNvSpPr>
+            <a:spLocks noGrp="1"/>
+          </p:cNvSpPr>
+          <p:nvPr>
+            <p:ph type="sldNum" sz="quarter" idx="5"/>
+          </p:nvPr>
+        </p:nvSpPr>
+        <p:spPr/>
+        <p:txBody>
+          <a:bodyPr/>
+          <a:lstStyle/>
+          <a:p>
+            <a:fld id="{32D77797-A849-1B4A-AE56-F618996AAF03}" type="slidenum">
+              <a:rPr lang="en-AU" smtClean="0"/>
+              <a:t>3</a:t>
+            </a:fld>
+            <a:endParaRPr lang="en-AU"/>
+          </a:p>
+        </p:txBody>
+      </p:sp>
+    </p:spTree>
+    <p:extLst>
+      <p:ext uri="{BB962C8B-B14F-4D97-AF65-F5344CB8AC3E}">
+        <p14:creationId xmlns:p14="http://schemas.microsoft.com/office/powerpoint/2010/main" val="3528448923"/>
+      </p:ext>
+    </p:extLst>
+  </p:cSld>
+  <p:clrMapOvr>
+    <a:masterClrMapping/>
+  </p:clrMapOvr>
+</p:notes>
+</file>
+
 <file path=ppt/slideLayouts/slideLayout1.xml><?xml version="1.0" encoding="utf-8"?>
 <p:sldLayout xmlns:a="http://schemas.openxmlformats.org/drawingml/2006/main" xmlns:r="http://schemas.openxmlformats.org/officeDocument/2006/relationships" xmlns:p="http://schemas.openxmlformats.org/presentationml/2006/main" type="title" preserve="1">
   <p:cSld name="Title Slide">
@@ -508,7 +593,7 @@
           </a:lstStyle>
           <a:p>
             <a:r>
-              <a:rPr lang="en-US" smtClean="0"/>
+              <a:rPr lang="en-US"/>
               <a:t>Click to edit Master title style</a:t>
             </a:r>
             <a:endParaRPr lang="en-US" dirty="0"/>
@@ -573,7 +658,7 @@
           </a:lstStyle>
           <a:p>
             <a:r>
-              <a:rPr lang="en-US" smtClean="0"/>
+              <a:rPr lang="en-US"/>
               <a:t>Click to edit Master subtitle style</a:t>
             </a:r>
             <a:endParaRPr lang="en-US" dirty="0"/>
@@ -597,7 +682,7 @@
           <a:p>
             <a:fld id="{EC9C0E98-8777-004C-BDC2-D1CE32AB939A}" type="datetimeFigureOut">
               <a:rPr lang="en-US" smtClean="0"/>
-              <a:t>12/6/18</a:t>
+              <a:t>10/25/19</a:t>
             </a:fld>
             <a:endParaRPr lang="en-US"/>
           </a:p>
@@ -686,7 +771,7 @@
           <a:lstStyle/>
           <a:p>
             <a:r>
-              <a:rPr lang="en-US" smtClean="0"/>
+              <a:rPr lang="en-US"/>
               <a:t>Click to edit Master title style</a:t>
             </a:r>
             <a:endParaRPr lang="en-US" dirty="0"/>
@@ -710,35 +795,35 @@
           <a:p>
             <a:pPr lvl="0"/>
             <a:r>
-              <a:rPr lang="en-US" smtClean="0"/>
+              <a:rPr lang="en-US"/>
               <a:t>Click to edit Master text styles</a:t>
             </a:r>
           </a:p>
           <a:p>
             <a:pPr lvl="1"/>
             <a:r>
-              <a:rPr lang="en-US" smtClean="0"/>
+              <a:rPr lang="en-US"/>
               <a:t>Second level</a:t>
             </a:r>
           </a:p>
           <a:p>
             <a:pPr lvl="2"/>
             <a:r>
-              <a:rPr lang="en-US" smtClean="0"/>
+              <a:rPr lang="en-US"/>
               <a:t>Third level</a:t>
             </a:r>
           </a:p>
           <a:p>
             <a:pPr lvl="3"/>
             <a:r>
-              <a:rPr lang="en-US" smtClean="0"/>
+              <a:rPr lang="en-US"/>
               <a:t>Fourth level</a:t>
             </a:r>
           </a:p>
           <a:p>
             <a:pPr lvl="4"/>
             <a:r>
-              <a:rPr lang="en-US" smtClean="0"/>
+              <a:rPr lang="en-US"/>
               <a:t>Fifth level</a:t>
             </a:r>
             <a:endParaRPr lang="en-US" dirty="0"/>
@@ -762,7 +847,7 @@
           <a:p>
             <a:fld id="{EC9C0E98-8777-004C-BDC2-D1CE32AB939A}" type="datetimeFigureOut">
               <a:rPr lang="en-US" smtClean="0"/>
-              <a:t>12/6/18</a:t>
+              <a:t>10/25/19</a:t>
             </a:fld>
             <a:endParaRPr lang="en-US"/>
           </a:p>
@@ -856,7 +941,7 @@
           <a:lstStyle/>
           <a:p>
             <a:r>
-              <a:rPr lang="en-US" smtClean="0"/>
+              <a:rPr lang="en-US"/>
               <a:t>Click to edit Master title style</a:t>
             </a:r>
             <a:endParaRPr lang="en-US" dirty="0"/>
@@ -885,35 +970,35 @@
           <a:p>
             <a:pPr lvl="0"/>
             <a:r>
-              <a:rPr lang="en-US" smtClean="0"/>
+              <a:rPr lang="en-US"/>
               <a:t>Click to edit Master text styles</a:t>
             </a:r>
           </a:p>
           <a:p>
             <a:pPr lvl="1"/>
             <a:r>
-              <a:rPr lang="en-US" smtClean="0"/>
+              <a:rPr lang="en-US"/>
               <a:t>Second level</a:t>
             </a:r>
           </a:p>
           <a:p>
             <a:pPr lvl="2"/>
             <a:r>
-              <a:rPr lang="en-US" smtClean="0"/>
+              <a:rPr lang="en-US"/>
               <a:t>Third level</a:t>
             </a:r>
           </a:p>
           <a:p>
             <a:pPr lvl="3"/>
             <a:r>
-              <a:rPr lang="en-US" smtClean="0"/>
+              <a:rPr lang="en-US"/>
               <a:t>Fourth level</a:t>
             </a:r>
           </a:p>
           <a:p>
             <a:pPr lvl="4"/>
             <a:r>
-              <a:rPr lang="en-US" smtClean="0"/>
+              <a:rPr lang="en-US"/>
               <a:t>Fifth level</a:t>
             </a:r>
             <a:endParaRPr lang="en-US" dirty="0"/>
@@ -937,7 +1022,7 @@
           <a:p>
             <a:fld id="{EC9C0E98-8777-004C-BDC2-D1CE32AB939A}" type="datetimeFigureOut">
               <a:rPr lang="en-US" smtClean="0"/>
-              <a:t>12/6/18</a:t>
+              <a:t>10/25/19</a:t>
             </a:fld>
             <a:endParaRPr lang="en-US"/>
           </a:p>
@@ -1026,7 +1111,7 @@
           <a:lstStyle/>
           <a:p>
             <a:r>
-              <a:rPr lang="en-US" smtClean="0"/>
+              <a:rPr lang="en-US"/>
               <a:t>Click to edit Master title style</a:t>
             </a:r>
             <a:endParaRPr lang="en-US" dirty="0"/>
@@ -1050,35 +1135,35 @@
           <a:p>
             <a:pPr lvl="0"/>
             <a:r>
-              <a:rPr lang="en-US" smtClean="0"/>
+              <a:rPr lang="en-US"/>
               <a:t>Click to edit Master text styles</a:t>
             </a:r>
           </a:p>
           <a:p>
             <a:pPr lvl="1"/>
             <a:r>
-              <a:rPr lang="en-US" smtClean="0"/>
+              <a:rPr lang="en-US"/>
               <a:t>Second level</a:t>
             </a:r>
           </a:p>
           <a:p>
             <a:pPr lvl="2"/>
             <a:r>
-              <a:rPr lang="en-US" smtClean="0"/>
+              <a:rPr lang="en-US"/>
               <a:t>Third level</a:t>
             </a:r>
           </a:p>
           <a:p>
             <a:pPr lvl="3"/>
             <a:r>
-              <a:rPr lang="en-US" smtClean="0"/>
+              <a:rPr lang="en-US"/>
               <a:t>Fourth level</a:t>
             </a:r>
           </a:p>
           <a:p>
             <a:pPr lvl="4"/>
             <a:r>
-              <a:rPr lang="en-US" smtClean="0"/>
+              <a:rPr lang="en-US"/>
               <a:t>Fifth level</a:t>
             </a:r>
             <a:endParaRPr lang="en-US" dirty="0"/>
@@ -1102,7 +1187,7 @@
           <a:p>
             <a:fld id="{EC9C0E98-8777-004C-BDC2-D1CE32AB939A}" type="datetimeFigureOut">
               <a:rPr lang="en-US" smtClean="0"/>
-              <a:t>12/6/18</a:t>
+              <a:t>10/25/19</a:t>
             </a:fld>
             <a:endParaRPr lang="en-US"/>
           </a:p>
@@ -1200,7 +1285,7 @@
           </a:lstStyle>
           <a:p>
             <a:r>
-              <a:rPr lang="en-US" smtClean="0"/>
+              <a:rPr lang="en-US"/>
               <a:t>Click to edit Master title style</a:t>
             </a:r>
             <a:endParaRPr lang="en-US" dirty="0"/>
@@ -1318,7 +1403,7 @@
           <a:p>
             <a:pPr lvl="0"/>
             <a:r>
-              <a:rPr lang="en-US" smtClean="0"/>
+              <a:rPr lang="en-US"/>
               <a:t>Click to edit Master text styles</a:t>
             </a:r>
           </a:p>
@@ -1341,7 +1426,7 @@
           <a:p>
             <a:fld id="{EC9C0E98-8777-004C-BDC2-D1CE32AB939A}" type="datetimeFigureOut">
               <a:rPr lang="en-US" smtClean="0"/>
-              <a:t>12/6/18</a:t>
+              <a:t>10/25/19</a:t>
             </a:fld>
             <a:endParaRPr lang="en-US"/>
           </a:p>
@@ -1430,7 +1515,7 @@
           <a:lstStyle/>
           <a:p>
             <a:r>
-              <a:rPr lang="en-US" smtClean="0"/>
+              <a:rPr lang="en-US"/>
               <a:t>Click to edit Master title style</a:t>
             </a:r>
             <a:endParaRPr lang="en-US" dirty="0"/>
@@ -1459,35 +1544,35 @@
           <a:p>
             <a:pPr lvl="0"/>
             <a:r>
-              <a:rPr lang="en-US" smtClean="0"/>
+              <a:rPr lang="en-US"/>
               <a:t>Click to edit Master text styles</a:t>
             </a:r>
           </a:p>
           <a:p>
             <a:pPr lvl="1"/>
             <a:r>
-              <a:rPr lang="en-US" smtClean="0"/>
+              <a:rPr lang="en-US"/>
               <a:t>Second level</a:t>
             </a:r>
           </a:p>
           <a:p>
             <a:pPr lvl="2"/>
             <a:r>
-              <a:rPr lang="en-US" smtClean="0"/>
+              <a:rPr lang="en-US"/>
               <a:t>Third level</a:t>
             </a:r>
           </a:p>
           <a:p>
             <a:pPr lvl="3"/>
             <a:r>
-              <a:rPr lang="en-US" smtClean="0"/>
+              <a:rPr lang="en-US"/>
               <a:t>Fourth level</a:t>
             </a:r>
           </a:p>
           <a:p>
             <a:pPr lvl="4"/>
             <a:r>
-              <a:rPr lang="en-US" smtClean="0"/>
+              <a:rPr lang="en-US"/>
               <a:t>Fifth level</a:t>
             </a:r>
             <a:endParaRPr lang="en-US" dirty="0"/>
@@ -1516,35 +1601,35 @@
           <a:p>
             <a:pPr lvl="0"/>
             <a:r>
-              <a:rPr lang="en-US" smtClean="0"/>
+              <a:rPr lang="en-US"/>
               <a:t>Click to edit Master text styles</a:t>
             </a:r>
           </a:p>
           <a:p>
             <a:pPr lvl="1"/>
             <a:r>
-              <a:rPr lang="en-US" smtClean="0"/>
+              <a:rPr lang="en-US"/>
               <a:t>Second level</a:t>
             </a:r>
           </a:p>
           <a:p>
             <a:pPr lvl="2"/>
             <a:r>
-              <a:rPr lang="en-US" smtClean="0"/>
+              <a:rPr lang="en-US"/>
               <a:t>Third level</a:t>
             </a:r>
           </a:p>
           <a:p>
             <a:pPr lvl="3"/>
             <a:r>
-              <a:rPr lang="en-US" smtClean="0"/>
+              <a:rPr lang="en-US"/>
               <a:t>Fourth level</a:t>
             </a:r>
           </a:p>
           <a:p>
             <a:pPr lvl="4"/>
             <a:r>
-              <a:rPr lang="en-US" smtClean="0"/>
+              <a:rPr lang="en-US"/>
               <a:t>Fifth level</a:t>
             </a:r>
             <a:endParaRPr lang="en-US" dirty="0"/>
@@ -1568,7 +1653,7 @@
           <a:p>
             <a:fld id="{EC9C0E98-8777-004C-BDC2-D1CE32AB939A}" type="datetimeFigureOut">
               <a:rPr lang="en-US" smtClean="0"/>
-              <a:t>12/6/18</a:t>
+              <a:t>10/25/19</a:t>
             </a:fld>
             <a:endParaRPr lang="en-US"/>
           </a:p>
@@ -1662,7 +1747,7 @@
           <a:lstStyle/>
           <a:p>
             <a:r>
-              <a:rPr lang="en-US" smtClean="0"/>
+              <a:rPr lang="en-US"/>
               <a:t>Click to edit Master title style</a:t>
             </a:r>
             <a:endParaRPr lang="en-US" dirty="0"/>
@@ -1728,7 +1813,7 @@
           <a:p>
             <a:pPr lvl="0"/>
             <a:r>
-              <a:rPr lang="en-US" smtClean="0"/>
+              <a:rPr lang="en-US"/>
               <a:t>Click to edit Master text styles</a:t>
             </a:r>
           </a:p>
@@ -1756,35 +1841,35 @@
           <a:p>
             <a:pPr lvl="0"/>
             <a:r>
-              <a:rPr lang="en-US" smtClean="0"/>
+              <a:rPr lang="en-US"/>
               <a:t>Click to edit Master text styles</a:t>
             </a:r>
           </a:p>
           <a:p>
             <a:pPr lvl="1"/>
             <a:r>
-              <a:rPr lang="en-US" smtClean="0"/>
+              <a:rPr lang="en-US"/>
               <a:t>Second level</a:t>
             </a:r>
           </a:p>
           <a:p>
             <a:pPr lvl="2"/>
             <a:r>
-              <a:rPr lang="en-US" smtClean="0"/>
+              <a:rPr lang="en-US"/>
               <a:t>Third level</a:t>
             </a:r>
           </a:p>
           <a:p>
             <a:pPr lvl="3"/>
             <a:r>
-              <a:rPr lang="en-US" smtClean="0"/>
+              <a:rPr lang="en-US"/>
               <a:t>Fourth level</a:t>
             </a:r>
           </a:p>
           <a:p>
             <a:pPr lvl="4"/>
             <a:r>
-              <a:rPr lang="en-US" smtClean="0"/>
+              <a:rPr lang="en-US"/>
               <a:t>Fifth level</a:t>
             </a:r>
             <a:endParaRPr lang="en-US" dirty="0"/>
@@ -1850,7 +1935,7 @@
           <a:p>
             <a:pPr lvl="0"/>
             <a:r>
-              <a:rPr lang="en-US" smtClean="0"/>
+              <a:rPr lang="en-US"/>
               <a:t>Click to edit Master text styles</a:t>
             </a:r>
           </a:p>
@@ -1878,35 +1963,35 @@
           <a:p>
             <a:pPr lvl="0"/>
             <a:r>
-              <a:rPr lang="en-US" smtClean="0"/>
+              <a:rPr lang="en-US"/>
               <a:t>Click to edit Master text styles</a:t>
             </a:r>
           </a:p>
           <a:p>
             <a:pPr lvl="1"/>
             <a:r>
-              <a:rPr lang="en-US" smtClean="0"/>
+              <a:rPr lang="en-US"/>
               <a:t>Second level</a:t>
             </a:r>
           </a:p>
           <a:p>
             <a:pPr lvl="2"/>
             <a:r>
-              <a:rPr lang="en-US" smtClean="0"/>
+              <a:rPr lang="en-US"/>
               <a:t>Third level</a:t>
             </a:r>
           </a:p>
           <a:p>
             <a:pPr lvl="3"/>
             <a:r>
-              <a:rPr lang="en-US" smtClean="0"/>
+              <a:rPr lang="en-US"/>
               <a:t>Fourth level</a:t>
             </a:r>
           </a:p>
           <a:p>
             <a:pPr lvl="4"/>
             <a:r>
-              <a:rPr lang="en-US" smtClean="0"/>
+              <a:rPr lang="en-US"/>
               <a:t>Fifth level</a:t>
             </a:r>
             <a:endParaRPr lang="en-US" dirty="0"/>
@@ -1930,7 +2015,7 @@
           <a:p>
             <a:fld id="{EC9C0E98-8777-004C-BDC2-D1CE32AB939A}" type="datetimeFigureOut">
               <a:rPr lang="en-US" smtClean="0"/>
-              <a:t>12/6/18</a:t>
+              <a:t>10/25/19</a:t>
             </a:fld>
             <a:endParaRPr lang="en-US"/>
           </a:p>
@@ -2019,7 +2104,7 @@
           <a:lstStyle/>
           <a:p>
             <a:r>
-              <a:rPr lang="en-US" smtClean="0"/>
+              <a:rPr lang="en-US"/>
               <a:t>Click to edit Master title style</a:t>
             </a:r>
             <a:endParaRPr lang="en-US" dirty="0"/>
@@ -2043,7 +2128,7 @@
           <a:p>
             <a:fld id="{EC9C0E98-8777-004C-BDC2-D1CE32AB939A}" type="datetimeFigureOut">
               <a:rPr lang="en-US" smtClean="0"/>
-              <a:t>12/6/18</a:t>
+              <a:t>10/25/19</a:t>
             </a:fld>
             <a:endParaRPr lang="en-US"/>
           </a:p>
@@ -2133,7 +2218,7 @@
           <a:p>
             <a:fld id="{EC9C0E98-8777-004C-BDC2-D1CE32AB939A}" type="datetimeFigureOut">
               <a:rPr lang="en-US" smtClean="0"/>
-              <a:t>12/6/18</a:t>
+              <a:t>10/25/19</a:t>
             </a:fld>
             <a:endParaRPr lang="en-US"/>
           </a:p>
@@ -2231,7 +2316,7 @@
           </a:lstStyle>
           <a:p>
             <a:r>
-              <a:rPr lang="en-US" smtClean="0"/>
+              <a:rPr lang="en-US"/>
               <a:t>Click to edit Master title style</a:t>
             </a:r>
             <a:endParaRPr lang="en-US" dirty="0"/>
@@ -2288,35 +2373,35 @@
           <a:p>
             <a:pPr lvl="0"/>
             <a:r>
-              <a:rPr lang="en-US" smtClean="0"/>
+              <a:rPr lang="en-US"/>
               <a:t>Click to edit Master text styles</a:t>
             </a:r>
           </a:p>
           <a:p>
             <a:pPr lvl="1"/>
             <a:r>
-              <a:rPr lang="en-US" smtClean="0"/>
+              <a:rPr lang="en-US"/>
               <a:t>Second level</a:t>
             </a:r>
           </a:p>
           <a:p>
             <a:pPr lvl="2"/>
             <a:r>
-              <a:rPr lang="en-US" smtClean="0"/>
+              <a:rPr lang="en-US"/>
               <a:t>Third level</a:t>
             </a:r>
           </a:p>
           <a:p>
             <a:pPr lvl="3"/>
             <a:r>
-              <a:rPr lang="en-US" smtClean="0"/>
+              <a:rPr lang="en-US"/>
               <a:t>Fourth level</a:t>
             </a:r>
           </a:p>
           <a:p>
             <a:pPr lvl="4"/>
             <a:r>
-              <a:rPr lang="en-US" smtClean="0"/>
+              <a:rPr lang="en-US"/>
               <a:t>Fifth level</a:t>
             </a:r>
             <a:endParaRPr lang="en-US" dirty="0"/>
@@ -2382,7 +2467,7 @@
           <a:p>
             <a:pPr lvl="0"/>
             <a:r>
-              <a:rPr lang="en-US" smtClean="0"/>
+              <a:rPr lang="en-US"/>
               <a:t>Click to edit Master text styles</a:t>
             </a:r>
           </a:p>
@@ -2405,7 +2490,7 @@
           <a:p>
             <a:fld id="{EC9C0E98-8777-004C-BDC2-D1CE32AB939A}" type="datetimeFigureOut">
               <a:rPr lang="en-US" smtClean="0"/>
-              <a:t>12/6/18</a:t>
+              <a:t>10/25/19</a:t>
             </a:fld>
             <a:endParaRPr lang="en-US"/>
           </a:p>
@@ -2503,7 +2588,7 @@
           </a:lstStyle>
           <a:p>
             <a:r>
-              <a:rPr lang="en-US" smtClean="0"/>
+              <a:rPr lang="en-US"/>
               <a:t>Click to edit Master title style</a:t>
             </a:r>
             <a:endParaRPr lang="en-US" dirty="0"/>
@@ -2568,7 +2653,7 @@
           </a:lstStyle>
           <a:p>
             <a:r>
-              <a:rPr lang="en-US" smtClean="0"/>
+              <a:rPr lang="en-US"/>
               <a:t>Drag picture to placeholder or click icon to add</a:t>
             </a:r>
             <a:endParaRPr lang="en-US" dirty="0"/>
@@ -2634,7 +2719,7 @@
           <a:p>
             <a:pPr lvl="0"/>
             <a:r>
-              <a:rPr lang="en-US" smtClean="0"/>
+              <a:rPr lang="en-US"/>
               <a:t>Click to edit Master text styles</a:t>
             </a:r>
           </a:p>
@@ -2657,7 +2742,7 @@
           <a:p>
             <a:fld id="{EC9C0E98-8777-004C-BDC2-D1CE32AB939A}" type="datetimeFigureOut">
               <a:rPr lang="en-US" smtClean="0"/>
-              <a:t>12/6/18</a:t>
+              <a:t>10/25/19</a:t>
             </a:fld>
             <a:endParaRPr lang="en-US"/>
           </a:p>
@@ -2761,7 +2846,7 @@
           <a:lstStyle/>
           <a:p>
             <a:r>
-              <a:rPr lang="en-US" smtClean="0"/>
+              <a:rPr lang="en-US"/>
               <a:t>Click to edit Master title style</a:t>
             </a:r>
             <a:endParaRPr lang="en-US" dirty="0"/>
@@ -2795,35 +2880,35 @@
           <a:p>
             <a:pPr lvl="0"/>
             <a:r>
-              <a:rPr lang="en-US" smtClean="0"/>
+              <a:rPr lang="en-US"/>
               <a:t>Click to edit Master text styles</a:t>
             </a:r>
           </a:p>
           <a:p>
             <a:pPr lvl="1"/>
             <a:r>
-              <a:rPr lang="en-US" smtClean="0"/>
+              <a:rPr lang="en-US"/>
               <a:t>Second level</a:t>
             </a:r>
           </a:p>
           <a:p>
             <a:pPr lvl="2"/>
             <a:r>
-              <a:rPr lang="en-US" smtClean="0"/>
+              <a:rPr lang="en-US"/>
               <a:t>Third level</a:t>
             </a:r>
           </a:p>
           <a:p>
             <a:pPr lvl="3"/>
             <a:r>
-              <a:rPr lang="en-US" smtClean="0"/>
+              <a:rPr lang="en-US"/>
               <a:t>Fourth level</a:t>
             </a:r>
           </a:p>
           <a:p>
             <a:pPr lvl="4"/>
             <a:r>
-              <a:rPr lang="en-US" smtClean="0"/>
+              <a:rPr lang="en-US"/>
               <a:t>Fifth level</a:t>
             </a:r>
             <a:endParaRPr lang="en-US" dirty="0"/>
@@ -2865,7 +2950,7 @@
           <a:p>
             <a:fld id="{EC9C0E98-8777-004C-BDC2-D1CE32AB939A}" type="datetimeFigureOut">
               <a:rPr lang="en-US" smtClean="0"/>
-              <a:t>12/6/18</a:t>
+              <a:t>10/25/19</a:t>
             </a:fld>
             <a:endParaRPr lang="en-US"/>
           </a:p>
@@ -3494,6 +3579,207 @@
 </p:sld>
 </file>
 
+<file path=ppt/slides/slide3.xml><?xml version="1.0" encoding="utf-8"?>
+<p:sld xmlns:a="http://schemas.openxmlformats.org/drawingml/2006/main" xmlns:r="http://schemas.openxmlformats.org/officeDocument/2006/relationships" xmlns:p="http://schemas.openxmlformats.org/presentationml/2006/main">
+  <p:cSld>
+    <p:spTree>
+      <p:nvGrpSpPr>
+        <p:cNvPr id="1" name=""/>
+        <p:cNvGrpSpPr/>
+        <p:nvPr/>
+      </p:nvGrpSpPr>
+      <p:grpSpPr>
+        <a:xfrm>
+          <a:off x="0" y="0"/>
+          <a:ext cx="0" cy="0"/>
+          <a:chOff x="0" y="0"/>
+          <a:chExt cx="0" cy="0"/>
+        </a:xfrm>
+      </p:grpSpPr>
+      <p:pic>
+        <p:nvPicPr>
+          <p:cNvPr id="5" name="Picture 4"/>
+          <p:cNvPicPr>
+            <a:picLocks noChangeAspect="1"/>
+          </p:cNvPicPr>
+          <p:nvPr/>
+        </p:nvPicPr>
+        <p:blipFill>
+          <a:blip r:embed="rId3">
+            <a:extLst>
+              <a:ext uri="{28A0092B-C50C-407E-A947-70E740481C1C}">
+                <a14:useLocalDpi xmlns:a14="http://schemas.microsoft.com/office/drawing/2010/main" val="0"/>
+              </a:ext>
+            </a:extLst>
+          </a:blip>
+          <a:stretch>
+            <a:fillRect/>
+          </a:stretch>
+        </p:blipFill>
+        <p:spPr>
+          <a:xfrm>
+            <a:off x="4493250" y="3169031"/>
+            <a:ext cx="1133225" cy="861251"/>
+          </a:xfrm>
+          <a:prstGeom prst="rect">
+            <a:avLst/>
+          </a:prstGeom>
+          <a:ln w="34925">
+            <a:solidFill>
+              <a:schemeClr val="bg1"/>
+            </a:solidFill>
+          </a:ln>
+        </p:spPr>
+      </p:pic>
+      <p:pic>
+        <p:nvPicPr>
+          <p:cNvPr id="6" name="Picture 5"/>
+          <p:cNvPicPr>
+            <a:picLocks noChangeAspect="1"/>
+          </p:cNvPicPr>
+          <p:nvPr/>
+        </p:nvPicPr>
+        <p:blipFill>
+          <a:blip r:embed="rId3">
+            <a:extLst>
+              <a:ext uri="{28A0092B-C50C-407E-A947-70E740481C1C}">
+                <a14:useLocalDpi xmlns:a14="http://schemas.microsoft.com/office/drawing/2010/main" val="0"/>
+              </a:ext>
+            </a:extLst>
+          </a:blip>
+          <a:stretch>
+            <a:fillRect/>
+          </a:stretch>
+        </p:blipFill>
+        <p:spPr>
+          <a:xfrm>
+            <a:off x="4645650" y="3321431"/>
+            <a:ext cx="1133225" cy="861251"/>
+          </a:xfrm>
+          <a:prstGeom prst="rect">
+            <a:avLst/>
+          </a:prstGeom>
+          <a:ln w="34925">
+            <a:solidFill>
+              <a:schemeClr val="bg1"/>
+            </a:solidFill>
+          </a:ln>
+        </p:spPr>
+      </p:pic>
+      <p:pic>
+        <p:nvPicPr>
+          <p:cNvPr id="3" name="Picture 2">
+            <a:extLst>
+              <a:ext uri="{FF2B5EF4-FFF2-40B4-BE49-F238E27FC236}">
+                <a16:creationId xmlns:a16="http://schemas.microsoft.com/office/drawing/2014/main" id="{F49B6BAE-FA1B-754C-9DD3-A7916318C6D0}"/>
+              </a:ext>
+            </a:extLst>
+          </p:cNvPr>
+          <p:cNvPicPr>
+            <a:picLocks noChangeAspect="1"/>
+          </p:cNvPicPr>
+          <p:nvPr/>
+        </p:nvPicPr>
+        <p:blipFill>
+          <a:blip r:embed="rId4"/>
+          <a:stretch>
+            <a:fillRect/>
+          </a:stretch>
+        </p:blipFill>
+        <p:spPr>
+          <a:xfrm>
+            <a:off x="-1274757" y="0"/>
+            <a:ext cx="12788525" cy="7199313"/>
+          </a:xfrm>
+          <a:prstGeom prst="rect">
+            <a:avLst/>
+          </a:prstGeom>
+        </p:spPr>
+      </p:pic>
+      <p:pic>
+        <p:nvPicPr>
+          <p:cNvPr id="7" name="Picture 6">
+            <a:extLst>
+              <a:ext uri="{FF2B5EF4-FFF2-40B4-BE49-F238E27FC236}">
+                <a16:creationId xmlns:a16="http://schemas.microsoft.com/office/drawing/2014/main" id="{79B03319-57A1-A748-8533-987F4BF9C708}"/>
+              </a:ext>
+            </a:extLst>
+          </p:cNvPr>
+          <p:cNvPicPr>
+            <a:picLocks noChangeAspect="1"/>
+          </p:cNvPicPr>
+          <p:nvPr/>
+        </p:nvPicPr>
+        <p:blipFill>
+          <a:blip r:embed="rId3">
+            <a:extLst>
+              <a:ext uri="{28A0092B-C50C-407E-A947-70E740481C1C}">
+                <a14:useLocalDpi xmlns:a14="http://schemas.microsoft.com/office/drawing/2010/main" val="0"/>
+              </a:ext>
+            </a:extLst>
+          </a:blip>
+          <a:stretch>
+            <a:fillRect/>
+          </a:stretch>
+        </p:blipFill>
+        <p:spPr>
+          <a:xfrm>
+            <a:off x="4535107" y="2738405"/>
+            <a:ext cx="1133225" cy="861251"/>
+          </a:xfrm>
+          <a:prstGeom prst="rect">
+            <a:avLst/>
+          </a:prstGeom>
+          <a:ln w="34925">
+            <a:solidFill>
+              <a:schemeClr val="bg1"/>
+            </a:solidFill>
+          </a:ln>
+        </p:spPr>
+      </p:pic>
+      <p:pic>
+        <p:nvPicPr>
+          <p:cNvPr id="4" name="Picture 3">
+            <a:extLst>
+              <a:ext uri="{FF2B5EF4-FFF2-40B4-BE49-F238E27FC236}">
+                <a16:creationId xmlns:a16="http://schemas.microsoft.com/office/drawing/2014/main" id="{844316D8-2847-8D4A-BDBE-F93CCA6A691C}"/>
+              </a:ext>
+            </a:extLst>
+          </p:cNvPr>
+          <p:cNvPicPr>
+            <a:picLocks noChangeAspect="1"/>
+          </p:cNvPicPr>
+          <p:nvPr/>
+        </p:nvPicPr>
+        <p:blipFill>
+          <a:blip r:embed="rId5"/>
+          <a:stretch>
+            <a:fillRect/>
+          </a:stretch>
+        </p:blipFill>
+        <p:spPr>
+          <a:xfrm>
+            <a:off x="9213503" y="5610576"/>
+            <a:ext cx="1047647" cy="993458"/>
+          </a:xfrm>
+          <a:prstGeom prst="rect">
+            <a:avLst/>
+          </a:prstGeom>
+        </p:spPr>
+      </p:pic>
+    </p:spTree>
+    <p:extLst>
+      <p:ext uri="{BB962C8B-B14F-4D97-AF65-F5344CB8AC3E}">
+        <p14:creationId xmlns:p14="http://schemas.microsoft.com/office/powerpoint/2010/main" val="801496342"/>
+      </p:ext>
+    </p:extLst>
+  </p:cSld>
+  <p:clrMapOvr>
+    <a:masterClrMapping/>
+  </p:clrMapOvr>
+</p:sld>
+</file>
+
 <file path=ppt/theme/theme1.xml><?xml version="1.0" encoding="utf-8"?>
 <a:theme xmlns:a="http://schemas.openxmlformats.org/drawingml/2006/main" name="Office Theme">
   <a:themeElements>

</xml_diff>